<commit_message>
2020_11_26 Train Inquiry UI 90%
</commit_message>
<xml_diff>
--- a/작업한 내용/1주차 (2020_11_16 ~ 2020_11_20)/기차 예매 프로그램 1주차.pptx
+++ b/작업한 내용/1주차 (2020_11_16 ~ 2020_11_20)/기차 예매 프로그램 1주차.pptx
@@ -7,14 +7,20 @@
   <p:sldIdLst>
     <p:sldId id="256" r:id="rId2"/>
     <p:sldId id="257" r:id="rId3"/>
-    <p:sldId id="258" r:id="rId4"/>
-    <p:sldId id="259" r:id="rId5"/>
-    <p:sldId id="260" r:id="rId6"/>
-    <p:sldId id="261" r:id="rId7"/>
-    <p:sldId id="264" r:id="rId8"/>
-    <p:sldId id="262" r:id="rId9"/>
-    <p:sldId id="263" r:id="rId10"/>
-    <p:sldId id="265" r:id="rId11"/>
+    <p:sldId id="266" r:id="rId4"/>
+    <p:sldId id="258" r:id="rId5"/>
+    <p:sldId id="259" r:id="rId6"/>
+    <p:sldId id="260" r:id="rId7"/>
+    <p:sldId id="261" r:id="rId8"/>
+    <p:sldId id="264" r:id="rId9"/>
+    <p:sldId id="262" r:id="rId10"/>
+    <p:sldId id="263" r:id="rId11"/>
+    <p:sldId id="267" r:id="rId12"/>
+    <p:sldId id="268" r:id="rId13"/>
+    <p:sldId id="271" r:id="rId14"/>
+    <p:sldId id="269" r:id="rId15"/>
+    <p:sldId id="270" r:id="rId16"/>
+    <p:sldId id="265" r:id="rId17"/>
   </p:sldIdLst>
   <p:sldSz cx="12192000" cy="6858000"/>
   <p:notesSz cx="9926638" cy="6797675"/>
@@ -303,7 +309,7 @@
           <a:p>
             <a:fld id="{48A87A34-81AB-432B-8DAE-1953F412C126}" type="datetimeFigureOut">
               <a:rPr lang="en-US" smtClean="0"/>
-              <a:t>11/20/2020</a:t>
+              <a:t>11/26/2020</a:t>
             </a:fld>
             <a:endParaRPr lang="en-US" dirty="0"/>
           </a:p>
@@ -570,7 +576,7 @@
           <a:p>
             <a:fld id="{48A87A34-81AB-432B-8DAE-1953F412C126}" type="datetimeFigureOut">
               <a:rPr lang="en-US" smtClean="0"/>
-              <a:t>11/20/2020</a:t>
+              <a:t>11/26/2020</a:t>
             </a:fld>
             <a:endParaRPr lang="en-US" dirty="0"/>
           </a:p>
@@ -802,7 +808,7 @@
             <a:fld id="{48A87A34-81AB-432B-8DAE-1953F412C126}" type="datetimeFigureOut">
               <a:rPr lang="en-US" smtClean="0"/>
               <a:pPr/>
-              <a:t>11/20/2020</a:t>
+              <a:t>11/26/2020</a:t>
             </a:fld>
             <a:endParaRPr lang="en-US" dirty="0"/>
           </a:p>
@@ -1113,7 +1119,7 @@
             <a:fld id="{48A87A34-81AB-432B-8DAE-1953F412C126}" type="datetimeFigureOut">
               <a:rPr lang="en-US" smtClean="0"/>
               <a:pPr/>
-              <a:t>11/20/2020</a:t>
+              <a:t>11/26/2020</a:t>
             </a:fld>
             <a:endParaRPr lang="en-US" dirty="0"/>
           </a:p>
@@ -1587,7 +1593,7 @@
             <a:fld id="{48A87A34-81AB-432B-8DAE-1953F412C126}" type="datetimeFigureOut">
               <a:rPr lang="en-US" smtClean="0"/>
               <a:pPr/>
-              <a:t>11/20/2020</a:t>
+              <a:t>11/26/2020</a:t>
             </a:fld>
             <a:endParaRPr lang="en-US" dirty="0"/>
           </a:p>
@@ -2134,7 +2140,7 @@
           <a:p>
             <a:fld id="{48A87A34-81AB-432B-8DAE-1953F412C126}" type="datetimeFigureOut">
               <a:rPr lang="en-US" smtClean="0"/>
-              <a:t>11/20/2020</a:t>
+              <a:t>11/26/2020</a:t>
             </a:fld>
             <a:endParaRPr lang="en-US" dirty="0"/>
           </a:p>
@@ -2908,7 +2914,7 @@
           <a:p>
             <a:fld id="{48A87A34-81AB-432B-8DAE-1953F412C126}" type="datetimeFigureOut">
               <a:rPr lang="en-US" smtClean="0"/>
-              <a:t>11/20/2020</a:t>
+              <a:t>11/26/2020</a:t>
             </a:fld>
             <a:endParaRPr lang="en-US" dirty="0"/>
           </a:p>
@@ -3083,7 +3089,7 @@
           <a:p>
             <a:fld id="{48A87A34-81AB-432B-8DAE-1953F412C126}" type="datetimeFigureOut">
               <a:rPr lang="en-US" smtClean="0"/>
-              <a:t>11/20/2020</a:t>
+              <a:t>11/26/2020</a:t>
             </a:fld>
             <a:endParaRPr lang="en-US" dirty="0"/>
           </a:p>
@@ -3307,7 +3313,7 @@
             <a:fld id="{48A87A34-81AB-432B-8DAE-1953F412C126}" type="datetimeFigureOut">
               <a:rPr lang="en-US" smtClean="0"/>
               <a:pPr/>
-              <a:t>11/20/2020</a:t>
+              <a:t>11/26/2020</a:t>
             </a:fld>
             <a:endParaRPr lang="en-US" dirty="0"/>
           </a:p>
@@ -3487,7 +3493,7 @@
           <a:p>
             <a:fld id="{48A87A34-81AB-432B-8DAE-1953F412C126}" type="datetimeFigureOut">
               <a:rPr lang="en-US" smtClean="0"/>
-              <a:t>11/20/2020</a:t>
+              <a:t>11/26/2020</a:t>
             </a:fld>
             <a:endParaRPr lang="en-US" dirty="0"/>
           </a:p>
@@ -3777,7 +3783,7 @@
             <a:fld id="{48A87A34-81AB-432B-8DAE-1953F412C126}" type="datetimeFigureOut">
               <a:rPr lang="en-US" smtClean="0"/>
               <a:pPr/>
-              <a:t>11/20/2020</a:t>
+              <a:t>11/26/2020</a:t>
             </a:fld>
             <a:endParaRPr lang="en-US" dirty="0"/>
           </a:p>
@@ -4019,7 +4025,7 @@
           <a:p>
             <a:fld id="{48A87A34-81AB-432B-8DAE-1953F412C126}" type="datetimeFigureOut">
               <a:rPr lang="en-US" smtClean="0"/>
-              <a:t>11/20/2020</a:t>
+              <a:t>11/26/2020</a:t>
             </a:fld>
             <a:endParaRPr lang="en-US" dirty="0"/>
           </a:p>
@@ -4398,7 +4404,7 @@
           <a:p>
             <a:fld id="{48A87A34-81AB-432B-8DAE-1953F412C126}" type="datetimeFigureOut">
               <a:rPr lang="en-US" smtClean="0"/>
-              <a:t>11/20/2020</a:t>
+              <a:t>11/26/2020</a:t>
             </a:fld>
             <a:endParaRPr lang="en-US" dirty="0"/>
           </a:p>
@@ -4516,7 +4522,7 @@
           <a:p>
             <a:fld id="{48A87A34-81AB-432B-8DAE-1953F412C126}" type="datetimeFigureOut">
               <a:rPr lang="en-US" smtClean="0"/>
-              <a:t>11/20/2020</a:t>
+              <a:t>11/26/2020</a:t>
             </a:fld>
             <a:endParaRPr lang="en-US" dirty="0"/>
           </a:p>
@@ -4611,7 +4617,7 @@
           <a:p>
             <a:fld id="{48A87A34-81AB-432B-8DAE-1953F412C126}" type="datetimeFigureOut">
               <a:rPr lang="en-US" smtClean="0"/>
-              <a:t>11/20/2020</a:t>
+              <a:t>11/26/2020</a:t>
             </a:fld>
             <a:endParaRPr lang="en-US" dirty="0"/>
           </a:p>
@@ -4860,7 +4866,7 @@
           <a:p>
             <a:fld id="{48A87A34-81AB-432B-8DAE-1953F412C126}" type="datetimeFigureOut">
               <a:rPr lang="en-US" smtClean="0"/>
-              <a:t>11/20/2020</a:t>
+              <a:t>11/26/2020</a:t>
             </a:fld>
             <a:endParaRPr lang="en-US" dirty="0"/>
           </a:p>
@@ -5117,7 +5123,7 @@
           <a:p>
             <a:fld id="{48A87A34-81AB-432B-8DAE-1953F412C126}" type="datetimeFigureOut">
               <a:rPr lang="en-US" smtClean="0"/>
-              <a:t>11/20/2020</a:t>
+              <a:t>11/26/2020</a:t>
             </a:fld>
             <a:endParaRPr lang="en-US" dirty="0"/>
           </a:p>
@@ -5361,7 +5367,7 @@
             <a:fld id="{48A87A34-81AB-432B-8DAE-1953F412C126}" type="datetimeFigureOut">
               <a:rPr lang="en-US" smtClean="0"/>
               <a:pPr/>
-              <a:t>11/20/2020</a:t>
+              <a:t>11/26/2020</a:t>
             </a:fld>
             <a:endParaRPr lang="en-US" dirty="0"/>
           </a:p>
@@ -5791,20 +5797,14 @@
         </p:nvSpPr>
         <p:spPr/>
         <p:txBody>
-          <a:bodyPr/>
+          <a:bodyPr>
+            <a:normAutofit/>
+          </a:bodyPr>
           <a:lstStyle/>
           <a:p>
             <a:r>
-              <a:rPr lang="ko-KR" altLang="en-US" dirty="0"/>
-              <a:t>기차 예매 프로그램 </a:t>
-            </a:r>
-            <a:r>
-              <a:rPr lang="en-US" altLang="ko-KR" dirty="0"/>
-              <a:t>1</a:t>
-            </a:r>
-            <a:r>
-              <a:rPr lang="ko-KR" altLang="en-US" dirty="0"/>
-              <a:t>주차</a:t>
+              <a:rPr lang="ko-KR" altLang="en-US" sz="5400" dirty="0"/>
+              <a:t>기차 예매 프로그램 주차 발표</a:t>
             </a:r>
           </a:p>
         </p:txBody>
@@ -5842,7 +5842,7 @@
                 <a:latin typeface="나눔스퀘어" panose="020B0600000101010101" pitchFamily="50" charset="-127"/>
                 <a:ea typeface="나눔스퀘어" panose="020B0600000101010101" pitchFamily="50" charset="-127"/>
               </a:rPr>
-              <a:t>2020.11.23</a:t>
+              <a:t>2020.11.27</a:t>
             </a:r>
           </a:p>
           <a:p>
@@ -5918,6 +5918,1225 @@
                 <a:latin typeface="나눔스퀘어" panose="020B0600000101010101" pitchFamily="50" charset="-127"/>
                 <a:ea typeface="나눔스퀘어" panose="020B0600000101010101" pitchFamily="50" charset="-127"/>
               </a:rPr>
+              <a:t>문제점</a:t>
+            </a:r>
+          </a:p>
+        </p:txBody>
+      </p:sp>
+      <p:sp>
+        <p:nvSpPr>
+          <p:cNvPr id="3" name="내용 개체 틀 2">
+            <a:extLst>
+              <a:ext uri="{FF2B5EF4-FFF2-40B4-BE49-F238E27FC236}">
+                <a16:creationId xmlns:a16="http://schemas.microsoft.com/office/drawing/2014/main" id="{CE680D33-7DE6-430A-91B0-F2A3DC91933B}"/>
+              </a:ext>
+            </a:extLst>
+          </p:cNvPr>
+          <p:cNvSpPr>
+            <a:spLocks noGrp="1"/>
+          </p:cNvSpPr>
+          <p:nvPr>
+            <p:ph idx="1"/>
+          </p:nvPr>
+        </p:nvSpPr>
+        <p:spPr/>
+        <p:txBody>
+          <a:bodyPr/>
+          <a:lstStyle/>
+          <a:p>
+            <a:pPr>
+              <a:buFont typeface="Wingdings" panose="05000000000000000000" pitchFamily="2" charset="2"/>
+              <a:buChar char="v"/>
+            </a:pPr>
+            <a:endParaRPr lang="en-US" altLang="ko-KR" sz="1400" dirty="0">
+              <a:latin typeface="나눔스퀘어" panose="020B0600000101010101" pitchFamily="50" charset="-127"/>
+              <a:ea typeface="나눔스퀘어" panose="020B0600000101010101" pitchFamily="50" charset="-127"/>
+            </a:endParaRPr>
+          </a:p>
+          <a:p>
+            <a:pPr>
+              <a:buFont typeface="Wingdings" panose="05000000000000000000" pitchFamily="2" charset="2"/>
+              <a:buChar char="v"/>
+            </a:pPr>
+            <a:endParaRPr lang="en-US" altLang="ko-KR" sz="1400" dirty="0">
+              <a:latin typeface="나눔스퀘어" panose="020B0600000101010101" pitchFamily="50" charset="-127"/>
+              <a:ea typeface="나눔스퀘어" panose="020B0600000101010101" pitchFamily="50" charset="-127"/>
+            </a:endParaRPr>
+          </a:p>
+          <a:p>
+            <a:pPr>
+              <a:buFont typeface="Wingdings" panose="05000000000000000000" pitchFamily="2" charset="2"/>
+              <a:buChar char="v"/>
+            </a:pPr>
+            <a:r>
+              <a:rPr lang="en-US" altLang="ko-KR" sz="2400" dirty="0">
+                <a:latin typeface="나눔스퀘어" panose="020B0600000101010101" pitchFamily="50" charset="-127"/>
+                <a:ea typeface="나눔스퀘어" panose="020B0600000101010101" pitchFamily="50" charset="-127"/>
+              </a:rPr>
+              <a:t> Open API</a:t>
+            </a:r>
+            <a:endParaRPr lang="en-US" altLang="ko-KR" sz="1200" dirty="0">
+              <a:latin typeface="나눔스퀘어" panose="020B0600000101010101" pitchFamily="50" charset="-127"/>
+              <a:ea typeface="나눔스퀘어" panose="020B0600000101010101" pitchFamily="50" charset="-127"/>
+            </a:endParaRPr>
+          </a:p>
+          <a:p>
+            <a:pPr lvl="1">
+              <a:buFont typeface="Wingdings" panose="05000000000000000000" pitchFamily="2" charset="2"/>
+              <a:buChar char="Ø"/>
+            </a:pPr>
+            <a:r>
+              <a:rPr lang="en-US" altLang="ko-KR" sz="2200" dirty="0">
+                <a:latin typeface="나눔스퀘어" panose="020B0600000101010101" pitchFamily="50" charset="-127"/>
+                <a:ea typeface="나눔스퀘어" panose="020B0600000101010101" pitchFamily="50" charset="-127"/>
+              </a:rPr>
+              <a:t> </a:t>
+            </a:r>
+            <a:r>
+              <a:rPr lang="ko-KR" altLang="en-US" sz="2200" dirty="0">
+                <a:latin typeface="나눔스퀘어" panose="020B0600000101010101" pitchFamily="50" charset="-127"/>
+                <a:ea typeface="나눔스퀘어" panose="020B0600000101010101" pitchFamily="50" charset="-127"/>
+              </a:rPr>
+              <a:t>프로그램이 새로 실행될 때마다 </a:t>
+            </a:r>
+            <a:r>
+              <a:rPr lang="en-US" altLang="ko-KR" sz="2200" b="1" dirty="0">
+                <a:latin typeface="나눔스퀘어 Bold" panose="020B0600000101010101" pitchFamily="50" charset="-127"/>
+                <a:ea typeface="나눔스퀘어 Bold" panose="020B0600000101010101" pitchFamily="50" charset="-127"/>
+              </a:rPr>
+              <a:t>TrainAPI</a:t>
+            </a:r>
+            <a:r>
+              <a:rPr lang="ko-KR" altLang="en-US" sz="2200" dirty="0">
+                <a:latin typeface="나눔스퀘어" panose="020B0600000101010101" pitchFamily="50" charset="-127"/>
+                <a:ea typeface="나눔스퀘어" panose="020B0600000101010101" pitchFamily="50" charset="-127"/>
+              </a:rPr>
+              <a:t>에서 기차역 목록을 </a:t>
+            </a:r>
+            <a:r>
+              <a:rPr lang="en-US" altLang="ko-KR" sz="2200" dirty="0">
+                <a:latin typeface="나눔스퀘어 Bold" panose="020B0600000101010101" pitchFamily="50" charset="-127"/>
+                <a:ea typeface="나눔스퀘어 Bold" panose="020B0600000101010101" pitchFamily="50" charset="-127"/>
+              </a:rPr>
+              <a:t>OpenAPI</a:t>
+            </a:r>
+            <a:r>
+              <a:rPr lang="ko-KR" altLang="en-US" sz="2200" dirty="0">
+                <a:latin typeface="나눔스퀘어" panose="020B0600000101010101" pitchFamily="50" charset="-127"/>
+                <a:ea typeface="나눔스퀘어" panose="020B0600000101010101" pitchFamily="50" charset="-127"/>
+              </a:rPr>
+              <a:t>에 요청</a:t>
+            </a:r>
+            <a:endParaRPr lang="en-US" altLang="ko-KR" sz="2200" dirty="0">
+              <a:latin typeface="나눔스퀘어" panose="020B0600000101010101" pitchFamily="50" charset="-127"/>
+              <a:ea typeface="나눔스퀘어" panose="020B0600000101010101" pitchFamily="50" charset="-127"/>
+            </a:endParaRPr>
+          </a:p>
+          <a:p>
+            <a:pPr lvl="2">
+              <a:buFont typeface="Wingdings" panose="05000000000000000000" pitchFamily="2" charset="2"/>
+              <a:buChar char="§"/>
+            </a:pPr>
+            <a:r>
+              <a:rPr lang="en-US" altLang="ko-KR" dirty="0">
+                <a:latin typeface="나눔스퀘어" panose="020B0600000101010101" pitchFamily="50" charset="-127"/>
+                <a:ea typeface="나눔스퀘어" panose="020B0600000101010101" pitchFamily="50" charset="-127"/>
+              </a:rPr>
+              <a:t> </a:t>
+            </a:r>
+            <a:r>
+              <a:rPr lang="ko-KR" altLang="en-US" dirty="0">
+                <a:latin typeface="나눔스퀘어" panose="020B0600000101010101" pitchFamily="50" charset="-127"/>
+                <a:ea typeface="나눔스퀘어" panose="020B0600000101010101" pitchFamily="50" charset="-127"/>
+              </a:rPr>
+              <a:t>트래픽 횟수 제한 </a:t>
+            </a:r>
+            <a:r>
+              <a:rPr lang="en-US" altLang="ko-KR" dirty="0">
+                <a:latin typeface="나눔스퀘어" panose="020B0600000101010101" pitchFamily="50" charset="-127"/>
+                <a:ea typeface="나눔스퀘어" panose="020B0600000101010101" pitchFamily="50" charset="-127"/>
+              </a:rPr>
+              <a:t>1000  </a:t>
+            </a:r>
+            <a:r>
+              <a:rPr lang="ko-KR" altLang="en-US" dirty="0">
+                <a:latin typeface="나눔스퀘어" panose="020B0600000101010101" pitchFamily="50" charset="-127"/>
+                <a:ea typeface="나눔스퀘어" panose="020B0600000101010101" pitchFamily="50" charset="-127"/>
+              </a:rPr>
+              <a:t>→  금방 제한에 막힘</a:t>
+            </a:r>
+            <a:endParaRPr lang="en-US" altLang="ko-KR" dirty="0">
+              <a:latin typeface="나눔스퀘어" panose="020B0600000101010101" pitchFamily="50" charset="-127"/>
+              <a:ea typeface="나눔스퀘어" panose="020B0600000101010101" pitchFamily="50" charset="-127"/>
+            </a:endParaRPr>
+          </a:p>
+          <a:p>
+            <a:pPr lvl="2">
+              <a:buFont typeface="Wingdings" panose="05000000000000000000" pitchFamily="2" charset="2"/>
+              <a:buChar char="§"/>
+            </a:pPr>
+            <a:endParaRPr lang="en-US" altLang="ko-KR" dirty="0">
+              <a:latin typeface="나눔스퀘어" panose="020B0600000101010101" pitchFamily="50" charset="-127"/>
+              <a:ea typeface="나눔스퀘어" panose="020B0600000101010101" pitchFamily="50" charset="-127"/>
+            </a:endParaRPr>
+          </a:p>
+          <a:p>
+            <a:pPr>
+              <a:buFont typeface="Wingdings" panose="05000000000000000000" pitchFamily="2" charset="2"/>
+              <a:buChar char="ü"/>
+            </a:pPr>
+            <a:r>
+              <a:rPr lang="en-US" altLang="ko-KR" dirty="0">
+                <a:latin typeface="나눔스퀘어" panose="020B0600000101010101" pitchFamily="50" charset="-127"/>
+                <a:ea typeface="나눔스퀘어" panose="020B0600000101010101" pitchFamily="50" charset="-127"/>
+              </a:rPr>
+              <a:t> </a:t>
+            </a:r>
+            <a:r>
+              <a:rPr lang="ko-KR" altLang="en-US" dirty="0">
+                <a:latin typeface="나눔스퀘어" panose="020B0600000101010101" pitchFamily="50" charset="-127"/>
+                <a:ea typeface="나눔스퀘어" panose="020B0600000101010101" pitchFamily="50" charset="-127"/>
+              </a:rPr>
+              <a:t>파일 입출력으로 해결 예정</a:t>
+            </a:r>
+            <a:endParaRPr lang="en-US" altLang="ko-KR" dirty="0">
+              <a:latin typeface="나눔스퀘어" panose="020B0600000101010101" pitchFamily="50" charset="-127"/>
+              <a:ea typeface="나눔스퀘어" panose="020B0600000101010101" pitchFamily="50" charset="-127"/>
+            </a:endParaRPr>
+          </a:p>
+          <a:p>
+            <a:pPr lvl="1">
+              <a:buFont typeface="Wingdings" panose="05000000000000000000" pitchFamily="2" charset="2"/>
+              <a:buChar char="Ø"/>
+            </a:pPr>
+            <a:endParaRPr lang="en-US" altLang="ko-KR" dirty="0">
+              <a:latin typeface="나눔스퀘어" panose="020B0600000101010101" pitchFamily="50" charset="-127"/>
+              <a:ea typeface="나눔스퀘어" panose="020B0600000101010101" pitchFamily="50" charset="-127"/>
+            </a:endParaRPr>
+          </a:p>
+        </p:txBody>
+      </p:sp>
+    </p:spTree>
+    <p:extLst>
+      <p:ext uri="{BB962C8B-B14F-4D97-AF65-F5344CB8AC3E}">
+        <p14:creationId xmlns:p14="http://schemas.microsoft.com/office/powerpoint/2010/main" val="3101324227"/>
+      </p:ext>
+    </p:extLst>
+  </p:cSld>
+  <p:clrMapOvr>
+    <a:masterClrMapping/>
+  </p:clrMapOvr>
+</p:sld>
+</file>
+
+<file path=ppt/slides/slide11.xml><?xml version="1.0" encoding="utf-8"?>
+<p:sld xmlns:a="http://schemas.openxmlformats.org/drawingml/2006/main" xmlns:r="http://schemas.openxmlformats.org/officeDocument/2006/relationships" xmlns:p="http://schemas.openxmlformats.org/presentationml/2006/main">
+  <p:cSld>
+    <p:spTree>
+      <p:nvGrpSpPr>
+        <p:cNvPr id="1" name=""/>
+        <p:cNvGrpSpPr/>
+        <p:nvPr/>
+      </p:nvGrpSpPr>
+      <p:grpSpPr>
+        <a:xfrm>
+          <a:off x="0" y="0"/>
+          <a:ext cx="0" cy="0"/>
+          <a:chOff x="0" y="0"/>
+          <a:chExt cx="0" cy="0"/>
+        </a:xfrm>
+      </p:grpSpPr>
+      <p:sp>
+        <p:nvSpPr>
+          <p:cNvPr id="2" name="제목 1">
+            <a:extLst>
+              <a:ext uri="{FF2B5EF4-FFF2-40B4-BE49-F238E27FC236}">
+                <a16:creationId xmlns:a16="http://schemas.microsoft.com/office/drawing/2014/main" id="{D40C6CE3-F724-47F8-89B5-E4B379394AB1}"/>
+              </a:ext>
+            </a:extLst>
+          </p:cNvPr>
+          <p:cNvSpPr>
+            <a:spLocks noGrp="1"/>
+          </p:cNvSpPr>
+          <p:nvPr>
+            <p:ph type="ctrTitle"/>
+          </p:nvPr>
+        </p:nvSpPr>
+        <p:spPr/>
+        <p:txBody>
+          <a:bodyPr>
+            <a:normAutofit/>
+          </a:bodyPr>
+          <a:lstStyle/>
+          <a:p>
+            <a:r>
+              <a:rPr lang="en-US" altLang="ko-KR" sz="5400" dirty="0"/>
+              <a:t>2 </a:t>
+            </a:r>
+            <a:r>
+              <a:rPr lang="ko-KR" altLang="en-US" sz="5400" dirty="0"/>
+              <a:t>주차</a:t>
+            </a:r>
+          </a:p>
+        </p:txBody>
+      </p:sp>
+      <p:sp>
+        <p:nvSpPr>
+          <p:cNvPr id="3" name="부제목 2">
+            <a:extLst>
+              <a:ext uri="{FF2B5EF4-FFF2-40B4-BE49-F238E27FC236}">
+                <a16:creationId xmlns:a16="http://schemas.microsoft.com/office/drawing/2014/main" id="{E008D253-F6DC-4039-A6A5-957CF1CA268C}"/>
+              </a:ext>
+            </a:extLst>
+          </p:cNvPr>
+          <p:cNvSpPr>
+            <a:spLocks noGrp="1"/>
+          </p:cNvSpPr>
+          <p:nvPr>
+            <p:ph type="subTitle" idx="1"/>
+          </p:nvPr>
+        </p:nvSpPr>
+        <p:spPr>
+          <a:xfrm>
+            <a:off x="2213263" y="3803073"/>
+            <a:ext cx="9227921" cy="1498768"/>
+          </a:xfrm>
+        </p:spPr>
+        <p:txBody>
+          <a:bodyPr>
+            <a:normAutofit/>
+          </a:bodyPr>
+          <a:lstStyle/>
+          <a:p>
+            <a:endParaRPr lang="en-US" altLang="ko-KR" dirty="0">
+              <a:latin typeface="나눔스퀘어" panose="020B0600000101010101" pitchFamily="50" charset="-127"/>
+              <a:ea typeface="나눔스퀘어" panose="020B0600000101010101" pitchFamily="50" charset="-127"/>
+            </a:endParaRPr>
+          </a:p>
+        </p:txBody>
+      </p:sp>
+    </p:spTree>
+    <p:extLst>
+      <p:ext uri="{BB962C8B-B14F-4D97-AF65-F5344CB8AC3E}">
+        <p14:creationId xmlns:p14="http://schemas.microsoft.com/office/powerpoint/2010/main" val="1379719832"/>
+      </p:ext>
+    </p:extLst>
+  </p:cSld>
+  <p:clrMapOvr>
+    <a:masterClrMapping/>
+  </p:clrMapOvr>
+</p:sld>
+</file>
+
+<file path=ppt/slides/slide12.xml><?xml version="1.0" encoding="utf-8"?>
+<p:sld xmlns:a="http://schemas.openxmlformats.org/drawingml/2006/main" xmlns:r="http://schemas.openxmlformats.org/officeDocument/2006/relationships" xmlns:p="http://schemas.openxmlformats.org/presentationml/2006/main">
+  <p:cSld>
+    <p:spTree>
+      <p:nvGrpSpPr>
+        <p:cNvPr id="1" name=""/>
+        <p:cNvGrpSpPr/>
+        <p:nvPr/>
+      </p:nvGrpSpPr>
+      <p:grpSpPr>
+        <a:xfrm>
+          <a:off x="0" y="0"/>
+          <a:ext cx="0" cy="0"/>
+          <a:chOff x="0" y="0"/>
+          <a:chExt cx="0" cy="0"/>
+        </a:xfrm>
+      </p:grpSpPr>
+      <p:sp>
+        <p:nvSpPr>
+          <p:cNvPr id="2" name="제목 1">
+            <a:extLst>
+              <a:ext uri="{FF2B5EF4-FFF2-40B4-BE49-F238E27FC236}">
+                <a16:creationId xmlns:a16="http://schemas.microsoft.com/office/drawing/2014/main" id="{36E46BD5-9BF8-4A36-B399-C907B8D17343}"/>
+              </a:ext>
+            </a:extLst>
+          </p:cNvPr>
+          <p:cNvSpPr>
+            <a:spLocks noGrp="1"/>
+          </p:cNvSpPr>
+          <p:nvPr>
+            <p:ph type="title"/>
+          </p:nvPr>
+        </p:nvSpPr>
+        <p:spPr/>
+        <p:txBody>
+          <a:bodyPr>
+            <a:normAutofit/>
+          </a:bodyPr>
+          <a:lstStyle/>
+          <a:p>
+            <a:r>
+              <a:rPr lang="ko-KR" altLang="en-US" sz="4400" dirty="0">
+                <a:latin typeface="나눔스퀘어" panose="020B0600000101010101" pitchFamily="50" charset="-127"/>
+                <a:ea typeface="나눔스퀘어" panose="020B0600000101010101" pitchFamily="50" charset="-127"/>
+              </a:rPr>
+              <a:t>진행 상황</a:t>
+            </a:r>
+          </a:p>
+        </p:txBody>
+      </p:sp>
+      <p:sp>
+        <p:nvSpPr>
+          <p:cNvPr id="3" name="내용 개체 틀 2">
+            <a:extLst>
+              <a:ext uri="{FF2B5EF4-FFF2-40B4-BE49-F238E27FC236}">
+                <a16:creationId xmlns:a16="http://schemas.microsoft.com/office/drawing/2014/main" id="{CE680D33-7DE6-430A-91B0-F2A3DC91933B}"/>
+              </a:ext>
+            </a:extLst>
+          </p:cNvPr>
+          <p:cNvSpPr>
+            <a:spLocks noGrp="1"/>
+          </p:cNvSpPr>
+          <p:nvPr>
+            <p:ph idx="1"/>
+          </p:nvPr>
+        </p:nvSpPr>
+        <p:spPr/>
+        <p:txBody>
+          <a:bodyPr/>
+          <a:lstStyle/>
+          <a:p>
+            <a:pPr>
+              <a:buFont typeface="Wingdings" panose="05000000000000000000" pitchFamily="2" charset="2"/>
+              <a:buChar char="v"/>
+            </a:pPr>
+            <a:r>
+              <a:rPr lang="en-US" altLang="ko-KR" sz="2400" dirty="0">
+                <a:latin typeface="나눔스퀘어" panose="020B0600000101010101" pitchFamily="50" charset="-127"/>
+                <a:ea typeface="나눔스퀘어" panose="020B0600000101010101" pitchFamily="50" charset="-127"/>
+              </a:rPr>
+              <a:t> </a:t>
+            </a:r>
+            <a:r>
+              <a:rPr lang="ko-KR" altLang="en-US" sz="2400" dirty="0">
+                <a:latin typeface="나눔스퀘어" panose="020B0600000101010101" pitchFamily="50" charset="-127"/>
+                <a:ea typeface="나눔스퀘어" panose="020B0600000101010101" pitchFamily="50" charset="-127"/>
+              </a:rPr>
+              <a:t>열차 조회</a:t>
+            </a:r>
+            <a:endParaRPr lang="en-US" altLang="ko-KR" sz="2400" dirty="0">
+              <a:latin typeface="나눔스퀘어" panose="020B0600000101010101" pitchFamily="50" charset="-127"/>
+              <a:ea typeface="나눔스퀘어" panose="020B0600000101010101" pitchFamily="50" charset="-127"/>
+            </a:endParaRPr>
+          </a:p>
+        </p:txBody>
+      </p:sp>
+      <p:pic>
+        <p:nvPicPr>
+          <p:cNvPr id="9" name="그림 8">
+            <a:extLst>
+              <a:ext uri="{FF2B5EF4-FFF2-40B4-BE49-F238E27FC236}">
+                <a16:creationId xmlns:a16="http://schemas.microsoft.com/office/drawing/2014/main" id="{F377055D-2F01-4950-A4F1-B54AFAE32EAE}"/>
+              </a:ext>
+            </a:extLst>
+          </p:cNvPr>
+          <p:cNvPicPr>
+            <a:picLocks noChangeAspect="1"/>
+          </p:cNvPicPr>
+          <p:nvPr/>
+        </p:nvPicPr>
+        <p:blipFill>
+          <a:blip r:embed="rId2"/>
+          <a:stretch>
+            <a:fillRect/>
+          </a:stretch>
+        </p:blipFill>
+        <p:spPr>
+          <a:xfrm>
+            <a:off x="607504" y="2882831"/>
+            <a:ext cx="5289958" cy="3717993"/>
+          </a:xfrm>
+          <a:prstGeom prst="rect">
+            <a:avLst/>
+          </a:prstGeom>
+          <a:ln w="19050">
+            <a:solidFill>
+              <a:schemeClr val="tx1"/>
+            </a:solidFill>
+          </a:ln>
+        </p:spPr>
+      </p:pic>
+      <p:pic>
+        <p:nvPicPr>
+          <p:cNvPr id="11" name="그림 10">
+            <a:extLst>
+              <a:ext uri="{FF2B5EF4-FFF2-40B4-BE49-F238E27FC236}">
+                <a16:creationId xmlns:a16="http://schemas.microsoft.com/office/drawing/2014/main" id="{048785FA-41E4-4DDA-8851-AAAB4C96E63F}"/>
+              </a:ext>
+            </a:extLst>
+          </p:cNvPr>
+          <p:cNvPicPr>
+            <a:picLocks noChangeAspect="1"/>
+          </p:cNvPicPr>
+          <p:nvPr/>
+        </p:nvPicPr>
+        <p:blipFill>
+          <a:blip r:embed="rId3"/>
+          <a:stretch>
+            <a:fillRect/>
+          </a:stretch>
+        </p:blipFill>
+        <p:spPr>
+          <a:xfrm>
+            <a:off x="6216242" y="2882830"/>
+            <a:ext cx="5289958" cy="3717993"/>
+          </a:xfrm>
+          <a:prstGeom prst="rect">
+            <a:avLst/>
+          </a:prstGeom>
+          <a:ln w="19050">
+            <a:solidFill>
+              <a:schemeClr val="tx1"/>
+            </a:solidFill>
+          </a:ln>
+        </p:spPr>
+      </p:pic>
+    </p:spTree>
+    <p:extLst>
+      <p:ext uri="{BB962C8B-B14F-4D97-AF65-F5344CB8AC3E}">
+        <p14:creationId xmlns:p14="http://schemas.microsoft.com/office/powerpoint/2010/main" val="374480857"/>
+      </p:ext>
+    </p:extLst>
+  </p:cSld>
+  <p:clrMapOvr>
+    <a:masterClrMapping/>
+  </p:clrMapOvr>
+</p:sld>
+</file>
+
+<file path=ppt/slides/slide13.xml><?xml version="1.0" encoding="utf-8"?>
+<p:sld xmlns:a="http://schemas.openxmlformats.org/drawingml/2006/main" xmlns:r="http://schemas.openxmlformats.org/officeDocument/2006/relationships" xmlns:p="http://schemas.openxmlformats.org/presentationml/2006/main">
+  <p:cSld>
+    <p:spTree>
+      <p:nvGrpSpPr>
+        <p:cNvPr id="1" name=""/>
+        <p:cNvGrpSpPr/>
+        <p:nvPr/>
+      </p:nvGrpSpPr>
+      <p:grpSpPr>
+        <a:xfrm>
+          <a:off x="0" y="0"/>
+          <a:ext cx="0" cy="0"/>
+          <a:chOff x="0" y="0"/>
+          <a:chExt cx="0" cy="0"/>
+        </a:xfrm>
+      </p:grpSpPr>
+      <p:pic>
+        <p:nvPicPr>
+          <p:cNvPr id="5" name="그림 4">
+            <a:extLst>
+              <a:ext uri="{FF2B5EF4-FFF2-40B4-BE49-F238E27FC236}">
+                <a16:creationId xmlns:a16="http://schemas.microsoft.com/office/drawing/2014/main" id="{77CAE836-B1A1-48FD-933D-20523E4DD25C}"/>
+              </a:ext>
+            </a:extLst>
+          </p:cNvPr>
+          <p:cNvPicPr>
+            <a:picLocks noChangeAspect="1"/>
+          </p:cNvPicPr>
+          <p:nvPr/>
+        </p:nvPicPr>
+        <p:blipFill>
+          <a:blip r:embed="rId2"/>
+          <a:stretch>
+            <a:fillRect/>
+          </a:stretch>
+        </p:blipFill>
+        <p:spPr>
+          <a:xfrm>
+            <a:off x="1219548" y="3178538"/>
+            <a:ext cx="4761803" cy="3346784"/>
+          </a:xfrm>
+          <a:prstGeom prst="rect">
+            <a:avLst/>
+          </a:prstGeom>
+          <a:ln w="12700">
+            <a:solidFill>
+              <a:schemeClr val="tx1"/>
+            </a:solidFill>
+          </a:ln>
+        </p:spPr>
+      </p:pic>
+      <p:sp>
+        <p:nvSpPr>
+          <p:cNvPr id="2" name="제목 1">
+            <a:extLst>
+              <a:ext uri="{FF2B5EF4-FFF2-40B4-BE49-F238E27FC236}">
+                <a16:creationId xmlns:a16="http://schemas.microsoft.com/office/drawing/2014/main" id="{36E46BD5-9BF8-4A36-B399-C907B8D17343}"/>
+              </a:ext>
+            </a:extLst>
+          </p:cNvPr>
+          <p:cNvSpPr>
+            <a:spLocks noGrp="1"/>
+          </p:cNvSpPr>
+          <p:nvPr>
+            <p:ph type="title"/>
+          </p:nvPr>
+        </p:nvSpPr>
+        <p:spPr/>
+        <p:txBody>
+          <a:bodyPr>
+            <a:normAutofit/>
+          </a:bodyPr>
+          <a:lstStyle/>
+          <a:p>
+            <a:r>
+              <a:rPr lang="ko-KR" altLang="en-US" sz="4400" dirty="0">
+                <a:latin typeface="나눔스퀘어" panose="020B0600000101010101" pitchFamily="50" charset="-127"/>
+                <a:ea typeface="나눔스퀘어" panose="020B0600000101010101" pitchFamily="50" charset="-127"/>
+              </a:rPr>
+              <a:t>진행 상황</a:t>
+            </a:r>
+          </a:p>
+        </p:txBody>
+      </p:sp>
+      <p:sp>
+        <p:nvSpPr>
+          <p:cNvPr id="3" name="내용 개체 틀 2">
+            <a:extLst>
+              <a:ext uri="{FF2B5EF4-FFF2-40B4-BE49-F238E27FC236}">
+                <a16:creationId xmlns:a16="http://schemas.microsoft.com/office/drawing/2014/main" id="{CE680D33-7DE6-430A-91B0-F2A3DC91933B}"/>
+              </a:ext>
+            </a:extLst>
+          </p:cNvPr>
+          <p:cNvSpPr>
+            <a:spLocks noGrp="1"/>
+          </p:cNvSpPr>
+          <p:nvPr>
+            <p:ph idx="1"/>
+          </p:nvPr>
+        </p:nvSpPr>
+        <p:spPr/>
+        <p:txBody>
+          <a:bodyPr/>
+          <a:lstStyle/>
+          <a:p>
+            <a:pPr>
+              <a:buFont typeface="Wingdings" panose="05000000000000000000" pitchFamily="2" charset="2"/>
+              <a:buChar char="v"/>
+            </a:pPr>
+            <a:r>
+              <a:rPr lang="en-US" altLang="ko-KR" sz="2400" dirty="0">
+                <a:latin typeface="나눔스퀘어" panose="020B0600000101010101" pitchFamily="50" charset="-127"/>
+                <a:ea typeface="나눔스퀘어" panose="020B0600000101010101" pitchFamily="50" charset="-127"/>
+              </a:rPr>
+              <a:t> </a:t>
+            </a:r>
+            <a:r>
+              <a:rPr lang="ko-KR" altLang="en-US" sz="2400" dirty="0">
+                <a:latin typeface="나눔스퀘어" panose="020B0600000101010101" pitchFamily="50" charset="-127"/>
+                <a:ea typeface="나눔스퀘어" panose="020B0600000101010101" pitchFamily="50" charset="-127"/>
+              </a:rPr>
+              <a:t>열차 조회</a:t>
+            </a:r>
+            <a:endParaRPr lang="en-US" altLang="ko-KR" sz="2400" dirty="0">
+              <a:latin typeface="나눔스퀘어" panose="020B0600000101010101" pitchFamily="50" charset="-127"/>
+              <a:ea typeface="나눔스퀘어" panose="020B0600000101010101" pitchFamily="50" charset="-127"/>
+            </a:endParaRPr>
+          </a:p>
+          <a:p>
+            <a:pPr lvl="1">
+              <a:buFont typeface="Wingdings" panose="05000000000000000000" pitchFamily="2" charset="2"/>
+              <a:buChar char="Ø"/>
+            </a:pPr>
+            <a:r>
+              <a:rPr lang="en-US" altLang="ko-KR" sz="2200" dirty="0">
+                <a:latin typeface="나눔스퀘어" panose="020B0600000101010101" pitchFamily="50" charset="-127"/>
+                <a:ea typeface="나눔스퀘어" panose="020B0600000101010101" pitchFamily="50" charset="-127"/>
+              </a:rPr>
+              <a:t> </a:t>
+            </a:r>
+            <a:r>
+              <a:rPr lang="ko-KR" altLang="en-US" sz="2200" dirty="0">
+                <a:latin typeface="나눔스퀘어" panose="020B0600000101010101" pitchFamily="50" charset="-127"/>
+                <a:ea typeface="나눔스퀘어" panose="020B0600000101010101" pitchFamily="50" charset="-127"/>
+              </a:rPr>
+              <a:t>종류별</a:t>
+            </a:r>
+            <a:endParaRPr lang="en-US" altLang="ko-KR" sz="2200" dirty="0">
+              <a:latin typeface="나눔스퀘어" panose="020B0600000101010101" pitchFamily="50" charset="-127"/>
+              <a:ea typeface="나눔스퀘어" panose="020B0600000101010101" pitchFamily="50" charset="-127"/>
+            </a:endParaRPr>
+          </a:p>
+        </p:txBody>
+      </p:sp>
+      <p:pic>
+        <p:nvPicPr>
+          <p:cNvPr id="7" name="그림 6">
+            <a:extLst>
+              <a:ext uri="{FF2B5EF4-FFF2-40B4-BE49-F238E27FC236}">
+                <a16:creationId xmlns:a16="http://schemas.microsoft.com/office/drawing/2014/main" id="{7243E1A5-1A0C-4618-A57C-9B6E23D410CA}"/>
+              </a:ext>
+            </a:extLst>
+          </p:cNvPr>
+          <p:cNvPicPr>
+            <a:picLocks noChangeAspect="1"/>
+          </p:cNvPicPr>
+          <p:nvPr/>
+        </p:nvPicPr>
+        <p:blipFill>
+          <a:blip r:embed="rId3"/>
+          <a:stretch>
+            <a:fillRect/>
+          </a:stretch>
+        </p:blipFill>
+        <p:spPr>
+          <a:xfrm>
+            <a:off x="6210651" y="3178538"/>
+            <a:ext cx="4761803" cy="3346784"/>
+          </a:xfrm>
+          <a:prstGeom prst="rect">
+            <a:avLst/>
+          </a:prstGeom>
+          <a:ln w="12700">
+            <a:solidFill>
+              <a:schemeClr val="tx1"/>
+            </a:solidFill>
+          </a:ln>
+        </p:spPr>
+      </p:pic>
+    </p:spTree>
+    <p:extLst>
+      <p:ext uri="{BB962C8B-B14F-4D97-AF65-F5344CB8AC3E}">
+        <p14:creationId xmlns:p14="http://schemas.microsoft.com/office/powerpoint/2010/main" val="2850842703"/>
+      </p:ext>
+    </p:extLst>
+  </p:cSld>
+  <p:clrMapOvr>
+    <a:masterClrMapping/>
+  </p:clrMapOvr>
+</p:sld>
+</file>
+
+<file path=ppt/slides/slide14.xml><?xml version="1.0" encoding="utf-8"?>
+<p:sld xmlns:a="http://schemas.openxmlformats.org/drawingml/2006/main" xmlns:r="http://schemas.openxmlformats.org/officeDocument/2006/relationships" xmlns:p="http://schemas.openxmlformats.org/presentationml/2006/main">
+  <p:cSld>
+    <p:spTree>
+      <p:nvGrpSpPr>
+        <p:cNvPr id="1" name=""/>
+        <p:cNvGrpSpPr/>
+        <p:nvPr/>
+      </p:nvGrpSpPr>
+      <p:grpSpPr>
+        <a:xfrm>
+          <a:off x="0" y="0"/>
+          <a:ext cx="0" cy="0"/>
+          <a:chOff x="0" y="0"/>
+          <a:chExt cx="0" cy="0"/>
+        </a:xfrm>
+      </p:grpSpPr>
+      <p:sp>
+        <p:nvSpPr>
+          <p:cNvPr id="2" name="제목 1">
+            <a:extLst>
+              <a:ext uri="{FF2B5EF4-FFF2-40B4-BE49-F238E27FC236}">
+                <a16:creationId xmlns:a16="http://schemas.microsoft.com/office/drawing/2014/main" id="{36E46BD5-9BF8-4A36-B399-C907B8D17343}"/>
+              </a:ext>
+            </a:extLst>
+          </p:cNvPr>
+          <p:cNvSpPr>
+            <a:spLocks noGrp="1"/>
+          </p:cNvSpPr>
+          <p:nvPr>
+            <p:ph type="title"/>
+          </p:nvPr>
+        </p:nvSpPr>
+        <p:spPr/>
+        <p:txBody>
+          <a:bodyPr>
+            <a:normAutofit/>
+          </a:bodyPr>
+          <a:lstStyle/>
+          <a:p>
+            <a:r>
+              <a:rPr lang="ko-KR" altLang="en-US" sz="4400" dirty="0">
+                <a:latin typeface="나눔스퀘어" panose="020B0600000101010101" pitchFamily="50" charset="-127"/>
+                <a:ea typeface="나눔스퀘어" panose="020B0600000101010101" pitchFamily="50" charset="-127"/>
+              </a:rPr>
+              <a:t>진행 상황</a:t>
+            </a:r>
+          </a:p>
+        </p:txBody>
+      </p:sp>
+      <p:sp>
+        <p:nvSpPr>
+          <p:cNvPr id="3" name="내용 개체 틀 2">
+            <a:extLst>
+              <a:ext uri="{FF2B5EF4-FFF2-40B4-BE49-F238E27FC236}">
+                <a16:creationId xmlns:a16="http://schemas.microsoft.com/office/drawing/2014/main" id="{CE680D33-7DE6-430A-91B0-F2A3DC91933B}"/>
+              </a:ext>
+            </a:extLst>
+          </p:cNvPr>
+          <p:cNvSpPr>
+            <a:spLocks noGrp="1"/>
+          </p:cNvSpPr>
+          <p:nvPr>
+            <p:ph idx="1"/>
+          </p:nvPr>
+        </p:nvSpPr>
+        <p:spPr/>
+        <p:txBody>
+          <a:bodyPr/>
+          <a:lstStyle/>
+          <a:p>
+            <a:pPr>
+              <a:buFont typeface="Wingdings" panose="05000000000000000000" pitchFamily="2" charset="2"/>
+              <a:buChar char="v"/>
+            </a:pPr>
+            <a:r>
+              <a:rPr lang="en-US" altLang="ko-KR" sz="2400" dirty="0">
+                <a:latin typeface="나눔스퀘어" panose="020B0600000101010101" pitchFamily="50" charset="-127"/>
+                <a:ea typeface="나눔스퀘어" panose="020B0600000101010101" pitchFamily="50" charset="-127"/>
+              </a:rPr>
+              <a:t> </a:t>
+            </a:r>
+            <a:r>
+              <a:rPr lang="ko-KR" altLang="en-US" sz="2400" dirty="0">
+                <a:latin typeface="나눔스퀘어" panose="020B0600000101010101" pitchFamily="50" charset="-127"/>
+                <a:ea typeface="나눔스퀘어" panose="020B0600000101010101" pitchFamily="50" charset="-127"/>
+              </a:rPr>
+              <a:t>좌석 선택</a:t>
+            </a:r>
+            <a:endParaRPr lang="en-US" altLang="ko-KR" sz="2400" dirty="0">
+              <a:latin typeface="나눔스퀘어" panose="020B0600000101010101" pitchFamily="50" charset="-127"/>
+              <a:ea typeface="나눔스퀘어" panose="020B0600000101010101" pitchFamily="50" charset="-127"/>
+            </a:endParaRPr>
+          </a:p>
+        </p:txBody>
+      </p:sp>
+      <p:pic>
+        <p:nvPicPr>
+          <p:cNvPr id="8" name="그림 7">
+            <a:extLst>
+              <a:ext uri="{FF2B5EF4-FFF2-40B4-BE49-F238E27FC236}">
+                <a16:creationId xmlns:a16="http://schemas.microsoft.com/office/drawing/2014/main" id="{17CFA052-4D75-44D9-9A46-19AE4955D024}"/>
+              </a:ext>
+            </a:extLst>
+          </p:cNvPr>
+          <p:cNvPicPr>
+            <a:picLocks noChangeAspect="1"/>
+          </p:cNvPicPr>
+          <p:nvPr/>
+        </p:nvPicPr>
+        <p:blipFill>
+          <a:blip r:embed="rId2"/>
+          <a:stretch>
+            <a:fillRect/>
+          </a:stretch>
+        </p:blipFill>
+        <p:spPr>
+          <a:xfrm>
+            <a:off x="607504" y="2882829"/>
+            <a:ext cx="5289958" cy="3717993"/>
+          </a:xfrm>
+          <a:prstGeom prst="rect">
+            <a:avLst/>
+          </a:prstGeom>
+          <a:ln w="12700">
+            <a:solidFill>
+              <a:schemeClr val="tx1"/>
+            </a:solidFill>
+          </a:ln>
+        </p:spPr>
+      </p:pic>
+      <p:pic>
+        <p:nvPicPr>
+          <p:cNvPr id="7" name="그림 6">
+            <a:extLst>
+              <a:ext uri="{FF2B5EF4-FFF2-40B4-BE49-F238E27FC236}">
+                <a16:creationId xmlns:a16="http://schemas.microsoft.com/office/drawing/2014/main" id="{FFC0A710-63FE-4D9F-881D-D82EC36BC2FB}"/>
+              </a:ext>
+            </a:extLst>
+          </p:cNvPr>
+          <p:cNvPicPr>
+            <a:picLocks noChangeAspect="1"/>
+          </p:cNvPicPr>
+          <p:nvPr/>
+        </p:nvPicPr>
+        <p:blipFill>
+          <a:blip r:embed="rId3"/>
+          <a:stretch>
+            <a:fillRect/>
+          </a:stretch>
+        </p:blipFill>
+        <p:spPr>
+          <a:xfrm>
+            <a:off x="6216242" y="2882829"/>
+            <a:ext cx="5289958" cy="3717992"/>
+          </a:xfrm>
+          <a:prstGeom prst="rect">
+            <a:avLst/>
+          </a:prstGeom>
+          <a:ln w="12700">
+            <a:solidFill>
+              <a:schemeClr val="tx1"/>
+            </a:solidFill>
+          </a:ln>
+        </p:spPr>
+      </p:pic>
+    </p:spTree>
+    <p:extLst>
+      <p:ext uri="{BB962C8B-B14F-4D97-AF65-F5344CB8AC3E}">
+        <p14:creationId xmlns:p14="http://schemas.microsoft.com/office/powerpoint/2010/main" val="3895530570"/>
+      </p:ext>
+    </p:extLst>
+  </p:cSld>
+  <p:clrMapOvr>
+    <a:masterClrMapping/>
+  </p:clrMapOvr>
+</p:sld>
+</file>
+
+<file path=ppt/slides/slide15.xml><?xml version="1.0" encoding="utf-8"?>
+<p:sld xmlns:a="http://schemas.openxmlformats.org/drawingml/2006/main" xmlns:r="http://schemas.openxmlformats.org/officeDocument/2006/relationships" xmlns:p="http://schemas.openxmlformats.org/presentationml/2006/main">
+  <p:cSld>
+    <p:spTree>
+      <p:nvGrpSpPr>
+        <p:cNvPr id="1" name=""/>
+        <p:cNvGrpSpPr/>
+        <p:nvPr/>
+      </p:nvGrpSpPr>
+      <p:grpSpPr>
+        <a:xfrm>
+          <a:off x="0" y="0"/>
+          <a:ext cx="0" cy="0"/>
+          <a:chOff x="0" y="0"/>
+          <a:chExt cx="0" cy="0"/>
+        </a:xfrm>
+      </p:grpSpPr>
+      <p:sp>
+        <p:nvSpPr>
+          <p:cNvPr id="2" name="제목 1">
+            <a:extLst>
+              <a:ext uri="{FF2B5EF4-FFF2-40B4-BE49-F238E27FC236}">
+                <a16:creationId xmlns:a16="http://schemas.microsoft.com/office/drawing/2014/main" id="{36E46BD5-9BF8-4A36-B399-C907B8D17343}"/>
+              </a:ext>
+            </a:extLst>
+          </p:cNvPr>
+          <p:cNvSpPr>
+            <a:spLocks noGrp="1"/>
+          </p:cNvSpPr>
+          <p:nvPr>
+            <p:ph type="title"/>
+          </p:nvPr>
+        </p:nvSpPr>
+        <p:spPr/>
+        <p:txBody>
+          <a:bodyPr>
+            <a:normAutofit/>
+          </a:bodyPr>
+          <a:lstStyle/>
+          <a:p>
+            <a:r>
+              <a:rPr lang="ko-KR" altLang="en-US" sz="4400" dirty="0">
+                <a:latin typeface="나눔스퀘어" panose="020B0600000101010101" pitchFamily="50" charset="-127"/>
+                <a:ea typeface="나눔스퀘어" panose="020B0600000101010101" pitchFamily="50" charset="-127"/>
+              </a:rPr>
+              <a:t>진행 상황</a:t>
+            </a:r>
+          </a:p>
+        </p:txBody>
+      </p:sp>
+      <p:sp>
+        <p:nvSpPr>
+          <p:cNvPr id="3" name="내용 개체 틀 2">
+            <a:extLst>
+              <a:ext uri="{FF2B5EF4-FFF2-40B4-BE49-F238E27FC236}">
+                <a16:creationId xmlns:a16="http://schemas.microsoft.com/office/drawing/2014/main" id="{CE680D33-7DE6-430A-91B0-F2A3DC91933B}"/>
+              </a:ext>
+            </a:extLst>
+          </p:cNvPr>
+          <p:cNvSpPr>
+            <a:spLocks noGrp="1"/>
+          </p:cNvSpPr>
+          <p:nvPr>
+            <p:ph idx="1"/>
+          </p:nvPr>
+        </p:nvSpPr>
+        <p:spPr/>
+        <p:txBody>
+          <a:bodyPr/>
+          <a:lstStyle/>
+          <a:p>
+            <a:pPr>
+              <a:buFont typeface="Wingdings" panose="05000000000000000000" pitchFamily="2" charset="2"/>
+              <a:buChar char="v"/>
+            </a:pPr>
+            <a:r>
+              <a:rPr lang="en-US" altLang="ko-KR" sz="2400" dirty="0">
+                <a:latin typeface="나눔스퀘어" panose="020B0600000101010101" pitchFamily="50" charset="-127"/>
+                <a:ea typeface="나눔스퀘어" panose="020B0600000101010101" pitchFamily="50" charset="-127"/>
+              </a:rPr>
+              <a:t> </a:t>
+            </a:r>
+            <a:r>
+              <a:rPr lang="ko-KR" altLang="en-US" sz="2400" dirty="0">
+                <a:latin typeface="나눔스퀘어" panose="020B0600000101010101" pitchFamily="50" charset="-127"/>
+                <a:ea typeface="나눔스퀘어" panose="020B0600000101010101" pitchFamily="50" charset="-127"/>
+              </a:rPr>
+              <a:t>뒤로 가기 </a:t>
+            </a:r>
+            <a:endParaRPr lang="en-US" altLang="ko-KR" sz="2400" dirty="0">
+              <a:latin typeface="나눔스퀘어" panose="020B0600000101010101" pitchFamily="50" charset="-127"/>
+              <a:ea typeface="나눔스퀘어" panose="020B0600000101010101" pitchFamily="50" charset="-127"/>
+            </a:endParaRPr>
+          </a:p>
+        </p:txBody>
+      </p:sp>
+      <p:pic>
+        <p:nvPicPr>
+          <p:cNvPr id="5" name="그림 4">
+            <a:extLst>
+              <a:ext uri="{FF2B5EF4-FFF2-40B4-BE49-F238E27FC236}">
+                <a16:creationId xmlns:a16="http://schemas.microsoft.com/office/drawing/2014/main" id="{283A1C0E-F029-4471-A1CA-1A5893BF00D9}"/>
+              </a:ext>
+            </a:extLst>
+          </p:cNvPr>
+          <p:cNvPicPr>
+            <a:picLocks noChangeAspect="1"/>
+          </p:cNvPicPr>
+          <p:nvPr/>
+        </p:nvPicPr>
+        <p:blipFill rotWithShape="1">
+          <a:blip r:embed="rId2"/>
+          <a:srcRect l="-2" r="49258" b="44706"/>
+          <a:stretch/>
+        </p:blipFill>
+        <p:spPr>
+          <a:xfrm>
+            <a:off x="685800" y="3303757"/>
+            <a:ext cx="3135575" cy="2401717"/>
+          </a:xfrm>
+          <a:prstGeom prst="rect">
+            <a:avLst/>
+          </a:prstGeom>
+          <a:ln w="19050">
+            <a:solidFill>
+              <a:schemeClr val="tx1"/>
+            </a:solidFill>
+          </a:ln>
+        </p:spPr>
+      </p:pic>
+      <p:pic>
+        <p:nvPicPr>
+          <p:cNvPr id="9" name="그림 8">
+            <a:extLst>
+              <a:ext uri="{FF2B5EF4-FFF2-40B4-BE49-F238E27FC236}">
+                <a16:creationId xmlns:a16="http://schemas.microsoft.com/office/drawing/2014/main" id="{851555CD-E7EC-47E9-8AA7-649957777324}"/>
+              </a:ext>
+            </a:extLst>
+          </p:cNvPr>
+          <p:cNvPicPr>
+            <a:picLocks noChangeAspect="1"/>
+          </p:cNvPicPr>
+          <p:nvPr/>
+        </p:nvPicPr>
+        <p:blipFill rotWithShape="1">
+          <a:blip r:embed="rId3"/>
+          <a:srcRect r="49261" b="44704"/>
+          <a:stretch/>
+        </p:blipFill>
+        <p:spPr>
+          <a:xfrm>
+            <a:off x="4528212" y="3303757"/>
+            <a:ext cx="3135575" cy="2401717"/>
+          </a:xfrm>
+          <a:prstGeom prst="rect">
+            <a:avLst/>
+          </a:prstGeom>
+          <a:ln w="19050">
+            <a:solidFill>
+              <a:schemeClr val="tx1"/>
+            </a:solidFill>
+          </a:ln>
+        </p:spPr>
+      </p:pic>
+      <p:pic>
+        <p:nvPicPr>
+          <p:cNvPr id="11" name="그림 10">
+            <a:extLst>
+              <a:ext uri="{FF2B5EF4-FFF2-40B4-BE49-F238E27FC236}">
+                <a16:creationId xmlns:a16="http://schemas.microsoft.com/office/drawing/2014/main" id="{6EE8B5F2-B306-4464-B3BE-851254E73C25}"/>
+              </a:ext>
+            </a:extLst>
+          </p:cNvPr>
+          <p:cNvPicPr>
+            <a:picLocks noChangeAspect="1"/>
+          </p:cNvPicPr>
+          <p:nvPr/>
+        </p:nvPicPr>
+        <p:blipFill rotWithShape="1">
+          <a:blip r:embed="rId4"/>
+          <a:srcRect r="49261" b="44704"/>
+          <a:stretch/>
+        </p:blipFill>
+        <p:spPr>
+          <a:xfrm>
+            <a:off x="8370625" y="3303757"/>
+            <a:ext cx="3135575" cy="2401717"/>
+          </a:xfrm>
+          <a:prstGeom prst="rect">
+            <a:avLst/>
+          </a:prstGeom>
+          <a:ln w="19050">
+            <a:solidFill>
+              <a:schemeClr val="tx1"/>
+            </a:solidFill>
+          </a:ln>
+        </p:spPr>
+      </p:pic>
+      <p:sp>
+        <p:nvSpPr>
+          <p:cNvPr id="19" name="화살표: 오른쪽 18">
+            <a:extLst>
+              <a:ext uri="{FF2B5EF4-FFF2-40B4-BE49-F238E27FC236}">
+                <a16:creationId xmlns:a16="http://schemas.microsoft.com/office/drawing/2014/main" id="{7232D9D7-68F0-4EE4-B9EE-969F60A7BBE7}"/>
+              </a:ext>
+            </a:extLst>
+          </p:cNvPr>
+          <p:cNvSpPr/>
+          <p:nvPr/>
+        </p:nvSpPr>
+        <p:spPr>
+          <a:xfrm>
+            <a:off x="3958562" y="4371975"/>
+            <a:ext cx="419100" cy="304800"/>
+          </a:xfrm>
+          <a:prstGeom prst="rightArrow">
+            <a:avLst/>
+          </a:prstGeom>
+        </p:spPr>
+        <p:style>
+          <a:lnRef idx="2">
+            <a:schemeClr val="accent1">
+              <a:shade val="50000"/>
+            </a:schemeClr>
+          </a:lnRef>
+          <a:fillRef idx="1">
+            <a:schemeClr val="accent1"/>
+          </a:fillRef>
+          <a:effectRef idx="0">
+            <a:schemeClr val="accent1"/>
+          </a:effectRef>
+          <a:fontRef idx="minor">
+            <a:schemeClr val="lt1"/>
+          </a:fontRef>
+        </p:style>
+        <p:txBody>
+          <a:bodyPr rtlCol="0" anchor="ctr"/>
+          <a:lstStyle/>
+          <a:p>
+            <a:pPr algn="ctr"/>
+            <a:endParaRPr lang="ko-KR" altLang="en-US"/>
+          </a:p>
+        </p:txBody>
+      </p:sp>
+      <p:sp>
+        <p:nvSpPr>
+          <p:cNvPr id="20" name="화살표: 오른쪽 19">
+            <a:extLst>
+              <a:ext uri="{FF2B5EF4-FFF2-40B4-BE49-F238E27FC236}">
+                <a16:creationId xmlns:a16="http://schemas.microsoft.com/office/drawing/2014/main" id="{36AA3BD3-DA51-4B42-9F38-2585C091EFAD}"/>
+              </a:ext>
+            </a:extLst>
+          </p:cNvPr>
+          <p:cNvSpPr/>
+          <p:nvPr/>
+        </p:nvSpPr>
+        <p:spPr>
+          <a:xfrm>
+            <a:off x="7807656" y="4352215"/>
+            <a:ext cx="419100" cy="304800"/>
+          </a:xfrm>
+          <a:prstGeom prst="rightArrow">
+            <a:avLst/>
+          </a:prstGeom>
+        </p:spPr>
+        <p:style>
+          <a:lnRef idx="2">
+            <a:schemeClr val="accent1">
+              <a:shade val="50000"/>
+            </a:schemeClr>
+          </a:lnRef>
+          <a:fillRef idx="1">
+            <a:schemeClr val="accent1"/>
+          </a:fillRef>
+          <a:effectRef idx="0">
+            <a:schemeClr val="accent1"/>
+          </a:effectRef>
+          <a:fontRef idx="minor">
+            <a:schemeClr val="lt1"/>
+          </a:fontRef>
+        </p:style>
+        <p:txBody>
+          <a:bodyPr rtlCol="0" anchor="ctr"/>
+          <a:lstStyle/>
+          <a:p>
+            <a:pPr algn="ctr"/>
+            <a:endParaRPr lang="ko-KR" altLang="en-US"/>
+          </a:p>
+        </p:txBody>
+      </p:sp>
+    </p:spTree>
+    <p:extLst>
+      <p:ext uri="{BB962C8B-B14F-4D97-AF65-F5344CB8AC3E}">
+        <p14:creationId xmlns:p14="http://schemas.microsoft.com/office/powerpoint/2010/main" val="1977520416"/>
+      </p:ext>
+    </p:extLst>
+  </p:cSld>
+  <p:clrMapOvr>
+    <a:masterClrMapping/>
+  </p:clrMapOvr>
+</p:sld>
+</file>
+
+<file path=ppt/slides/slide16.xml><?xml version="1.0" encoding="utf-8"?>
+<p:sld xmlns:a="http://schemas.openxmlformats.org/drawingml/2006/main" xmlns:r="http://schemas.openxmlformats.org/officeDocument/2006/relationships" xmlns:p="http://schemas.openxmlformats.org/presentationml/2006/main">
+  <p:cSld>
+    <p:spTree>
+      <p:nvGrpSpPr>
+        <p:cNvPr id="1" name=""/>
+        <p:cNvGrpSpPr/>
+        <p:nvPr/>
+      </p:nvGrpSpPr>
+      <p:grpSpPr>
+        <a:xfrm>
+          <a:off x="0" y="0"/>
+          <a:ext cx="0" cy="0"/>
+          <a:chOff x="0" y="0"/>
+          <a:chExt cx="0" cy="0"/>
+        </a:xfrm>
+      </p:grpSpPr>
+      <p:sp>
+        <p:nvSpPr>
+          <p:cNvPr id="2" name="제목 1">
+            <a:extLst>
+              <a:ext uri="{FF2B5EF4-FFF2-40B4-BE49-F238E27FC236}">
+                <a16:creationId xmlns:a16="http://schemas.microsoft.com/office/drawing/2014/main" id="{36E46BD5-9BF8-4A36-B399-C907B8D17343}"/>
+              </a:ext>
+            </a:extLst>
+          </p:cNvPr>
+          <p:cNvSpPr>
+            <a:spLocks noGrp="1"/>
+          </p:cNvSpPr>
+          <p:nvPr>
+            <p:ph type="title"/>
+          </p:nvPr>
+        </p:nvSpPr>
+        <p:spPr/>
+        <p:txBody>
+          <a:bodyPr>
+            <a:normAutofit/>
+          </a:bodyPr>
+          <a:lstStyle/>
+          <a:p>
+            <a:r>
+              <a:rPr lang="ko-KR" altLang="en-US" sz="4400" dirty="0">
+                <a:latin typeface="나눔스퀘어" panose="020B0600000101010101" pitchFamily="50" charset="-127"/>
+                <a:ea typeface="나눔스퀘어" panose="020B0600000101010101" pitchFamily="50" charset="-127"/>
+              </a:rPr>
               <a:t>추후 계획</a:t>
             </a:r>
           </a:p>
@@ -5938,7 +7157,7 @@
           <p:nvPr>
             <p:extLst>
               <p:ext uri="{D42A27DB-BD31-4B8C-83A1-F6EECF244321}">
-                <p14:modId xmlns:p14="http://schemas.microsoft.com/office/powerpoint/2010/main" val="3526138144"/>
+                <p14:modId xmlns:p14="http://schemas.microsoft.com/office/powerpoint/2010/main" val="1420587937"/>
               </p:ext>
             </p:extLst>
           </p:nvPr>
@@ -5998,12 +7217,13 @@
                     <a:p>
                       <a:pPr algn="ctr" latinLnBrk="1"/>
                       <a:r>
-                        <a:rPr lang="ko-KR" altLang="en-US" b="0" dirty="0">
-                          <a:latin typeface="나눔스퀘어 Bold" panose="020B0600000101010101" pitchFamily="50" charset="-127"/>
-                          <a:ea typeface="나눔스퀘어 Bold" panose="020B0600000101010101" pitchFamily="50" charset="-127"/>
-                        </a:rPr>
+                        <a:rPr lang="ko-KR" altLang="en-US" b="0" dirty="0"/>
                         <a:t>주차</a:t>
                       </a:r>
+                      <a:endParaRPr lang="ko-KR" altLang="en-US" b="0" dirty="0">
+                        <a:latin typeface="나눔스퀘어 Bold" panose="020B0600000101010101" pitchFamily="50" charset="-127"/>
+                        <a:ea typeface="나눔스퀘어 Bold" panose="020B0600000101010101" pitchFamily="50" charset="-127"/>
+                      </a:endParaRPr>
                     </a:p>
                   </a:txBody>
                   <a:tcPr anchor="ctr">
@@ -6034,10 +7254,7 @@
                     <a:p>
                       <a:pPr algn="ctr" latinLnBrk="1"/>
                       <a:r>
-                        <a:rPr lang="en-US" altLang="ko-KR" b="0" dirty="0">
-                          <a:latin typeface="나눔스퀘어 Bold" panose="020B0600000101010101" pitchFamily="50" charset="-127"/>
-                          <a:ea typeface="나눔스퀘어 Bold" panose="020B0600000101010101" pitchFamily="50" charset="-127"/>
-                        </a:rPr>
+                        <a:rPr lang="en-US" altLang="ko-KR" b="0" dirty="0"/>
                         <a:t>1</a:t>
                       </a:r>
                       <a:endParaRPr lang="ko-KR" altLang="en-US" b="0" dirty="0">
@@ -6067,12 +7284,45 @@
                       <a:r>
                         <a:rPr lang="en-US" altLang="ko-KR" b="0" dirty="0">
                           <a:solidFill>
+                            <a:schemeClr val="bg1"/>
+                          </a:solidFill>
+                        </a:rPr>
+                        <a:t>2</a:t>
+                      </a:r>
+                      <a:endParaRPr lang="ko-KR" altLang="en-US" b="0" dirty="0">
+                        <a:solidFill>
+                          <a:schemeClr val="bg1"/>
+                        </a:solidFill>
+                        <a:latin typeface="나눔스퀘어 Bold" panose="020B0600000101010101" pitchFamily="50" charset="-127"/>
+                        <a:ea typeface="나눔스퀘어 Bold" panose="020B0600000101010101" pitchFamily="50" charset="-127"/>
+                      </a:endParaRPr>
+                    </a:p>
+                  </a:txBody>
+                  <a:tcPr anchor="ctr">
+                    <a:lnT w="28575" cap="flat" cmpd="sng" algn="ctr">
+                      <a:solidFill>
+                        <a:schemeClr val="tx1"/>
+                      </a:solidFill>
+                      <a:prstDash val="solid"/>
+                      <a:round/>
+                      <a:headEnd type="none" w="med" len="med"/>
+                      <a:tailEnd type="none" w="med" len="med"/>
+                    </a:lnT>
+                  </a:tcPr>
+                </a:tc>
+                <a:tc>
+                  <a:txBody>
+                    <a:bodyPr/>
+                    <a:lstStyle/>
+                    <a:p>
+                      <a:pPr algn="ctr" latinLnBrk="1"/>
+                      <a:r>
+                        <a:rPr lang="en-US" altLang="ko-KR" b="0" dirty="0">
+                          <a:solidFill>
                             <a:schemeClr val="tx1"/>
                           </a:solidFill>
-                          <a:latin typeface="나눔스퀘어 Bold" panose="020B0600000101010101" pitchFamily="50" charset="-127"/>
-                          <a:ea typeface="나눔스퀘어 Bold" panose="020B0600000101010101" pitchFamily="50" charset="-127"/>
                         </a:rPr>
-                        <a:t>2</a:t>
+                        <a:t>3</a:t>
                       </a:r>
                       <a:endParaRPr lang="ko-KR" altLang="en-US" b="0" dirty="0">
                         <a:solidFill>
@@ -6105,41 +7355,7 @@
                     <a:p>
                       <a:pPr algn="ctr" latinLnBrk="1"/>
                       <a:r>
-                        <a:rPr lang="en-US" altLang="ko-KR" b="0" dirty="0">
-                          <a:latin typeface="나눔스퀘어 Bold" panose="020B0600000101010101" pitchFamily="50" charset="-127"/>
-                          <a:ea typeface="나눔스퀘어 Bold" panose="020B0600000101010101" pitchFamily="50" charset="-127"/>
-                        </a:rPr>
-                        <a:t>3</a:t>
-                      </a:r>
-                      <a:endParaRPr lang="ko-KR" altLang="en-US" b="0" dirty="0">
-                        <a:latin typeface="나눔스퀘어 Bold" panose="020B0600000101010101" pitchFamily="50" charset="-127"/>
-                        <a:ea typeface="나눔스퀘어 Bold" panose="020B0600000101010101" pitchFamily="50" charset="-127"/>
-                      </a:endParaRPr>
-                    </a:p>
-                  </a:txBody>
-                  <a:tcPr anchor="ctr">
-                    <a:lnT w="28575" cap="flat" cmpd="sng" algn="ctr">
-                      <a:solidFill>
-                        <a:schemeClr val="tx1"/>
-                      </a:solidFill>
-                      <a:prstDash val="solid"/>
-                      <a:round/>
-                      <a:headEnd type="none" w="med" len="med"/>
-                      <a:tailEnd type="none" w="med" len="med"/>
-                    </a:lnT>
-                  </a:tcPr>
-                </a:tc>
-                <a:tc>
-                  <a:txBody>
-                    <a:bodyPr/>
-                    <a:lstStyle/>
-                    <a:p>
-                      <a:pPr algn="ctr" latinLnBrk="1"/>
-                      <a:r>
-                        <a:rPr lang="en-US" altLang="ko-KR" b="0" dirty="0">
-                          <a:latin typeface="나눔스퀘어 Bold" panose="020B0600000101010101" pitchFamily="50" charset="-127"/>
-                          <a:ea typeface="나눔스퀘어 Bold" panose="020B0600000101010101" pitchFamily="50" charset="-127"/>
-                        </a:rPr>
+                        <a:rPr lang="en-US" altLang="ko-KR" b="0" dirty="0"/>
                         <a:t>4</a:t>
                       </a:r>
                       <a:endParaRPr lang="ko-KR" altLang="en-US" b="0" dirty="0">
@@ -6183,19 +7399,17 @@
                     <a:p>
                       <a:pPr algn="ctr" latinLnBrk="1"/>
                       <a:r>
-                        <a:rPr lang="en-US" altLang="ko-KR" dirty="0">
-                          <a:latin typeface="나눔스퀘어 Bold" panose="020B0600000101010101" pitchFamily="50" charset="-127"/>
-                          <a:ea typeface="나눔스퀘어 Bold" panose="020B0600000101010101" pitchFamily="50" charset="-127"/>
-                        </a:rPr>
+                        <a:rPr lang="en-US" altLang="ko-KR" dirty="0"/>
                         <a:t>API </a:t>
                       </a:r>
                       <a:r>
-                        <a:rPr lang="ko-KR" altLang="en-US" dirty="0">
-                          <a:latin typeface="나눔스퀘어 Bold" panose="020B0600000101010101" pitchFamily="50" charset="-127"/>
-                          <a:ea typeface="나눔스퀘어 Bold" panose="020B0600000101010101" pitchFamily="50" charset="-127"/>
-                        </a:rPr>
+                        <a:rPr lang="ko-KR" altLang="en-US" dirty="0"/>
                         <a:t>관련</a:t>
                       </a:r>
+                      <a:endParaRPr lang="ko-KR" altLang="en-US" dirty="0">
+                        <a:latin typeface="나눔스퀘어 Bold" panose="020B0600000101010101" pitchFamily="50" charset="-127"/>
+                        <a:ea typeface="나눔스퀘어 Bold" panose="020B0600000101010101" pitchFamily="50" charset="-127"/>
+                      </a:endParaRPr>
                     </a:p>
                   </a:txBody>
                   <a:tcPr anchor="ctr">
@@ -6216,7 +7430,21 @@
                     <a:lstStyle/>
                     <a:p>
                       <a:pPr algn="ctr" latinLnBrk="1"/>
-                      <a:endParaRPr lang="ko-KR" altLang="en-US">
+                      <a:endParaRPr lang="ko-KR" altLang="en-US" dirty="0">
+                        <a:latin typeface="나눔스퀘어 Bold" panose="020B0600000101010101" pitchFamily="50" charset="-127"/>
+                        <a:ea typeface="나눔스퀘어 Bold" panose="020B0600000101010101" pitchFamily="50" charset="-127"/>
+                      </a:endParaRPr>
+                    </a:p>
+                  </a:txBody>
+                  <a:tcPr anchor="ctr"/>
+                </a:tc>
+                <a:tc>
+                  <a:txBody>
+                    <a:bodyPr/>
+                    <a:lstStyle/>
+                    <a:p>
+                      <a:pPr algn="ctr" latinLnBrk="1"/>
+                      <a:endParaRPr lang="ko-KR" altLang="en-US" dirty="0">
                         <a:latin typeface="나눔스퀘어 Bold" panose="020B0600000101010101" pitchFamily="50" charset="-127"/>
                         <a:ea typeface="나눔스퀘어 Bold" panose="020B0600000101010101" pitchFamily="50" charset="-127"/>
                       </a:endParaRPr>
@@ -6241,20 +7469,6 @@
                       <a:srgbClr val="FFC000"/>
                     </a:solidFill>
                   </a:tcPr>
-                </a:tc>
-                <a:tc>
-                  <a:txBody>
-                    <a:bodyPr/>
-                    <a:lstStyle/>
-                    <a:p>
-                      <a:pPr algn="ctr" latinLnBrk="1"/>
-                      <a:endParaRPr lang="ko-KR" altLang="en-US" dirty="0">
-                        <a:latin typeface="나눔스퀘어 Bold" panose="020B0600000101010101" pitchFamily="50" charset="-127"/>
-                        <a:ea typeface="나눔스퀘어 Bold" panose="020B0600000101010101" pitchFamily="50" charset="-127"/>
-                      </a:endParaRPr>
-                    </a:p>
-                  </a:txBody>
-                  <a:tcPr anchor="ctr"/>
                 </a:tc>
                 <a:tc>
                   <a:txBody>
@@ -6294,10 +7508,7 @@
                     <a:p>
                       <a:pPr algn="ctr" latinLnBrk="1"/>
                       <a:r>
-                        <a:rPr lang="en-US" altLang="ko-KR" dirty="0">
-                          <a:latin typeface="나눔스퀘어 Bold" panose="020B0600000101010101" pitchFamily="50" charset="-127"/>
-                          <a:ea typeface="나눔스퀘어 Bold" panose="020B0600000101010101" pitchFamily="50" charset="-127"/>
-                        </a:rPr>
+                        <a:rPr lang="en-US" altLang="ko-KR" dirty="0"/>
                         <a:t>DB</a:t>
                       </a:r>
                       <a:endParaRPr lang="ko-KR" altLang="en-US" dirty="0">
@@ -6324,7 +7535,21 @@
                     <a:lstStyle/>
                     <a:p>
                       <a:pPr algn="ctr" latinLnBrk="1"/>
-                      <a:endParaRPr lang="ko-KR" altLang="en-US">
+                      <a:endParaRPr lang="ko-KR" altLang="en-US" dirty="0">
+                        <a:latin typeface="나눔스퀘어 Bold" panose="020B0600000101010101" pitchFamily="50" charset="-127"/>
+                        <a:ea typeface="나눔스퀘어 Bold" panose="020B0600000101010101" pitchFamily="50" charset="-127"/>
+                      </a:endParaRPr>
+                    </a:p>
+                  </a:txBody>
+                  <a:tcPr anchor="ctr"/>
+                </a:tc>
+                <a:tc>
+                  <a:txBody>
+                    <a:bodyPr/>
+                    <a:lstStyle/>
+                    <a:p>
+                      <a:pPr algn="ctr" latinLnBrk="1"/>
+                      <a:endParaRPr lang="ko-KR" altLang="en-US" dirty="0">
                         <a:latin typeface="나눔스퀘어 Bold" panose="020B0600000101010101" pitchFamily="50" charset="-127"/>
                         <a:ea typeface="나눔스퀘어 Bold" panose="020B0600000101010101" pitchFamily="50" charset="-127"/>
                       </a:endParaRPr>
@@ -6349,20 +7574,6 @@
                       <a:srgbClr val="FFC000"/>
                     </a:solidFill>
                   </a:tcPr>
-                </a:tc>
-                <a:tc>
-                  <a:txBody>
-                    <a:bodyPr/>
-                    <a:lstStyle/>
-                    <a:p>
-                      <a:pPr algn="ctr" latinLnBrk="1"/>
-                      <a:endParaRPr lang="ko-KR" altLang="en-US" dirty="0">
-                        <a:latin typeface="나눔스퀘어 Bold" panose="020B0600000101010101" pitchFamily="50" charset="-127"/>
-                        <a:ea typeface="나눔스퀘어 Bold" panose="020B0600000101010101" pitchFamily="50" charset="-127"/>
-                      </a:endParaRPr>
-                    </a:p>
-                  </a:txBody>
-                  <a:tcPr anchor="ctr"/>
                 </a:tc>
                 <a:tc>
                   <a:txBody>
@@ -6402,10 +7613,7 @@
                     <a:p>
                       <a:pPr algn="ctr" latinLnBrk="1"/>
                       <a:r>
-                        <a:rPr lang="en-US" altLang="ko-KR" dirty="0">
-                          <a:latin typeface="나눔스퀘어 Bold" panose="020B0600000101010101" pitchFamily="50" charset="-127"/>
-                          <a:ea typeface="나눔스퀘어 Bold" panose="020B0600000101010101" pitchFamily="50" charset="-127"/>
-                        </a:rPr>
+                        <a:rPr lang="en-US" altLang="ko-KR" dirty="0"/>
                         <a:t>UI</a:t>
                       </a:r>
                       <a:endParaRPr lang="ko-KR" altLang="en-US" dirty="0">
@@ -6452,11 +7660,7 @@
                       </a:endParaRPr>
                     </a:p>
                   </a:txBody>
-                  <a:tcPr anchor="ctr">
-                    <a:solidFill>
-                      <a:srgbClr val="FFC000"/>
-                    </a:solidFill>
-                  </a:tcPr>
+                  <a:tcPr anchor="ctr"/>
                 </a:tc>
                 <a:tc>
                   <a:txBody>
@@ -6470,7 +7674,11 @@
                       </a:endParaRPr>
                     </a:p>
                   </a:txBody>
-                  <a:tcPr anchor="ctr"/>
+                  <a:tcPr anchor="ctr">
+                    <a:solidFill>
+                      <a:srgbClr val="FFC000"/>
+                    </a:solidFill>
+                  </a:tcPr>
                 </a:tc>
                 <a:tc>
                   <a:txBody>
@@ -6510,12 +7718,13 @@
                     <a:p>
                       <a:pPr algn="ctr" latinLnBrk="1"/>
                       <a:r>
-                        <a:rPr lang="ko-KR" altLang="en-US" dirty="0">
-                          <a:latin typeface="나눔스퀘어 Bold" panose="020B0600000101010101" pitchFamily="50" charset="-127"/>
-                          <a:ea typeface="나눔스퀘어 Bold" panose="020B0600000101010101" pitchFamily="50" charset="-127"/>
-                        </a:rPr>
+                        <a:rPr lang="ko-KR" altLang="en-US" dirty="0"/>
                         <a:t>디버깅</a:t>
                       </a:r>
+                      <a:endParaRPr lang="ko-KR" altLang="en-US" dirty="0">
+                        <a:latin typeface="나눔스퀘어 Bold" panose="020B0600000101010101" pitchFamily="50" charset="-127"/>
+                        <a:ea typeface="나눔스퀘어 Bold" panose="020B0600000101010101" pitchFamily="50" charset="-127"/>
+                      </a:endParaRPr>
                     </a:p>
                   </a:txBody>
                   <a:tcPr anchor="ctr">
@@ -6556,11 +7765,7 @@
                       </a:endParaRPr>
                     </a:p>
                   </a:txBody>
-                  <a:tcPr anchor="ctr">
-                    <a:solidFill>
-                      <a:srgbClr val="FFC000"/>
-                    </a:solidFill>
-                  </a:tcPr>
+                  <a:tcPr anchor="ctr"/>
                 </a:tc>
                 <a:tc>
                   <a:txBody>
@@ -6574,7 +7779,11 @@
                       </a:endParaRPr>
                     </a:p>
                   </a:txBody>
-                  <a:tcPr anchor="ctr"/>
+                  <a:tcPr anchor="ctr">
+                    <a:solidFill>
+                      <a:srgbClr val="FFC000"/>
+                    </a:solidFill>
+                  </a:tcPr>
                 </a:tc>
                 <a:tc>
                   <a:txBody>
@@ -6614,12 +7823,13 @@
                     <a:p>
                       <a:pPr algn="ctr" latinLnBrk="1"/>
                       <a:r>
-                        <a:rPr lang="ko-KR" altLang="en-US" dirty="0">
-                          <a:latin typeface="나눔스퀘어 Bold" panose="020B0600000101010101" pitchFamily="50" charset="-127"/>
-                          <a:ea typeface="나눔스퀘어 Bold" panose="020B0600000101010101" pitchFamily="50" charset="-127"/>
-                        </a:rPr>
+                        <a:rPr lang="ko-KR" altLang="en-US" dirty="0"/>
                         <a:t>문서 작업</a:t>
                       </a:r>
+                      <a:endParaRPr lang="ko-KR" altLang="en-US" dirty="0">
+                        <a:latin typeface="나눔스퀘어 Bold" panose="020B0600000101010101" pitchFamily="50" charset="-127"/>
+                        <a:ea typeface="나눔스퀘어 Bold" panose="020B0600000101010101" pitchFamily="50" charset="-127"/>
+                      </a:endParaRPr>
                     </a:p>
                   </a:txBody>
                   <a:tcPr anchor="ctr">
@@ -6689,9 +7899,6 @@
                       <a:headEnd type="none" w="med" len="med"/>
                       <a:tailEnd type="none" w="med" len="med"/>
                     </a:lnB>
-                    <a:solidFill>
-                      <a:srgbClr val="FFC000"/>
-                    </a:solidFill>
                   </a:tcPr>
                 </a:tc>
                 <a:tc>
@@ -6716,6 +7923,9 @@
                       <a:headEnd type="none" w="med" len="med"/>
                       <a:tailEnd type="none" w="med" len="med"/>
                     </a:lnB>
+                    <a:solidFill>
+                      <a:srgbClr val="FFC000"/>
+                    </a:solidFill>
                   </a:tcPr>
                 </a:tc>
                 <a:tc>
@@ -7094,106 +8304,14 @@
                 <a:latin typeface="나눔스퀘어" panose="020B0600000101010101" pitchFamily="50" charset="-127"/>
                 <a:ea typeface="나눔스퀘어" panose="020B0600000101010101" pitchFamily="50" charset="-127"/>
               </a:rPr>
-              <a:t> </a:t>
+              <a:t> 1 </a:t>
             </a:r>
             <a:r>
               <a:rPr lang="ko-KR" altLang="en-US" sz="2400" dirty="0">
                 <a:latin typeface="나눔스퀘어" panose="020B0600000101010101" pitchFamily="50" charset="-127"/>
                 <a:ea typeface="나눔스퀘어" panose="020B0600000101010101" pitchFamily="50" charset="-127"/>
               </a:rPr>
-              <a:t>진행 상황</a:t>
-            </a:r>
-            <a:endParaRPr lang="en-US" altLang="ko-KR" sz="2400" dirty="0">
-              <a:latin typeface="나눔스퀘어" panose="020B0600000101010101" pitchFamily="50" charset="-127"/>
-              <a:ea typeface="나눔스퀘어" panose="020B0600000101010101" pitchFamily="50" charset="-127"/>
-            </a:endParaRPr>
-          </a:p>
-          <a:p>
-            <a:pPr lvl="1">
-              <a:buFont typeface="Wingdings" panose="05000000000000000000" pitchFamily="2" charset="2"/>
-              <a:buChar char="Ø"/>
-            </a:pPr>
-            <a:r>
-              <a:rPr lang="ko-KR" altLang="en-US" sz="2200" dirty="0">
-                <a:latin typeface="나눔스퀘어" panose="020B0600000101010101" pitchFamily="50" charset="-127"/>
-                <a:ea typeface="나눔스퀘어" panose="020B0600000101010101" pitchFamily="50" charset="-127"/>
-              </a:rPr>
-              <a:t> 로그인</a:t>
-            </a:r>
-            <a:r>
-              <a:rPr lang="en-US" altLang="ko-KR" sz="2200" dirty="0">
-                <a:latin typeface="나눔스퀘어" panose="020B0600000101010101" pitchFamily="50" charset="-127"/>
-                <a:ea typeface="나눔스퀘어" panose="020B0600000101010101" pitchFamily="50" charset="-127"/>
-              </a:rPr>
-              <a:t>, </a:t>
-            </a:r>
-            <a:r>
-              <a:rPr lang="ko-KR" altLang="en-US" sz="2200" dirty="0">
-                <a:latin typeface="나눔스퀘어" panose="020B0600000101010101" pitchFamily="50" charset="-127"/>
-                <a:ea typeface="나눔스퀘어" panose="020B0600000101010101" pitchFamily="50" charset="-127"/>
-              </a:rPr>
-              <a:t>회원가입</a:t>
-            </a:r>
-            <a:endParaRPr lang="en-US" altLang="ko-KR" sz="2200" dirty="0">
-              <a:latin typeface="나눔스퀘어" panose="020B0600000101010101" pitchFamily="50" charset="-127"/>
-              <a:ea typeface="나눔스퀘어" panose="020B0600000101010101" pitchFamily="50" charset="-127"/>
-            </a:endParaRPr>
-          </a:p>
-          <a:p>
-            <a:pPr lvl="1">
-              <a:buFont typeface="Wingdings" panose="05000000000000000000" pitchFamily="2" charset="2"/>
-              <a:buChar char="Ø"/>
-            </a:pPr>
-            <a:r>
-              <a:rPr lang="en-US" altLang="ko-KR" sz="2200" dirty="0">
-                <a:latin typeface="나눔스퀘어" panose="020B0600000101010101" pitchFamily="50" charset="-127"/>
-                <a:ea typeface="나눔스퀘어" panose="020B0600000101010101" pitchFamily="50" charset="-127"/>
-              </a:rPr>
-              <a:t> </a:t>
-            </a:r>
-            <a:r>
-              <a:rPr lang="ko-KR" altLang="en-US" sz="2200" dirty="0">
-                <a:latin typeface="나눔스퀘어" panose="020B0600000101010101" pitchFamily="50" charset="-127"/>
-                <a:ea typeface="나눔스퀘어" panose="020B0600000101010101" pitchFamily="50" charset="-127"/>
-              </a:rPr>
-              <a:t>승차권 예매</a:t>
-            </a:r>
-            <a:endParaRPr lang="en-US" altLang="ko-KR" sz="2200" dirty="0">
-              <a:latin typeface="나눔스퀘어" panose="020B0600000101010101" pitchFamily="50" charset="-127"/>
-              <a:ea typeface="나눔스퀘어" panose="020B0600000101010101" pitchFamily="50" charset="-127"/>
-            </a:endParaRPr>
-          </a:p>
-          <a:p>
-            <a:pPr lvl="1">
-              <a:buFont typeface="Wingdings" panose="05000000000000000000" pitchFamily="2" charset="2"/>
-              <a:buChar char="Ø"/>
-            </a:pPr>
-            <a:r>
-              <a:rPr lang="en-US" altLang="ko-KR" sz="2200" dirty="0">
-                <a:latin typeface="나눔스퀘어" panose="020B0600000101010101" pitchFamily="50" charset="-127"/>
-                <a:ea typeface="나눔스퀘어" panose="020B0600000101010101" pitchFamily="50" charset="-127"/>
-              </a:rPr>
-              <a:t> Open API</a:t>
-            </a:r>
-          </a:p>
-          <a:p>
-            <a:pPr>
-              <a:buFont typeface="Wingdings" panose="05000000000000000000" pitchFamily="2" charset="2"/>
-              <a:buChar char="v"/>
-            </a:pPr>
-            <a:r>
-              <a:rPr lang="en-US" altLang="ko-KR" sz="2400" dirty="0">
-                <a:latin typeface="나눔스퀘어" panose="020B0600000101010101" pitchFamily="50" charset="-127"/>
-                <a:ea typeface="나눔스퀘어" panose="020B0600000101010101" pitchFamily="50" charset="-127"/>
-              </a:rPr>
-              <a:t> </a:t>
-            </a:r>
-            <a:r>
-              <a:rPr lang="ko-KR" altLang="en-US" sz="2400" dirty="0">
-                <a:latin typeface="나눔스퀘어" panose="020B0600000101010101" pitchFamily="50" charset="-127"/>
-                <a:ea typeface="나눔스퀘어" panose="020B0600000101010101" pitchFamily="50" charset="-127"/>
-              </a:rPr>
-              <a:t>문제점</a:t>
+              <a:t>주차</a:t>
             </a:r>
             <a:endParaRPr lang="en-US" altLang="ko-KR" sz="2400" dirty="0">
               <a:latin typeface="나눔스퀘어" panose="020B0600000101010101" pitchFamily="50" charset="-127"/>
@@ -7220,25 +8338,15 @@
                 <a:latin typeface="나눔스퀘어" panose="020B0600000101010101" pitchFamily="50" charset="-127"/>
                 <a:ea typeface="나눔스퀘어" panose="020B0600000101010101" pitchFamily="50" charset="-127"/>
               </a:rPr>
-              <a:t> </a:t>
+              <a:t> 2 </a:t>
             </a:r>
             <a:r>
               <a:rPr lang="ko-KR" altLang="en-US" sz="2400" dirty="0">
                 <a:latin typeface="나눔스퀘어" panose="020B0600000101010101" pitchFamily="50" charset="-127"/>
                 <a:ea typeface="나눔스퀘어" panose="020B0600000101010101" pitchFamily="50" charset="-127"/>
               </a:rPr>
-              <a:t>추후 계획</a:t>
-            </a:r>
-            <a:endParaRPr lang="en-US" altLang="ko-KR" sz="2400" dirty="0">
-              <a:latin typeface="나눔스퀘어" panose="020B0600000101010101" pitchFamily="50" charset="-127"/>
-              <a:ea typeface="나눔스퀘어" panose="020B0600000101010101" pitchFamily="50" charset="-127"/>
-            </a:endParaRPr>
-          </a:p>
-          <a:p>
-            <a:pPr>
-              <a:buFont typeface="Wingdings" panose="05000000000000000000" pitchFamily="2" charset="2"/>
-              <a:buChar char="v"/>
-            </a:pPr>
+              <a:t>주차</a:t>
+            </a:r>
             <a:endParaRPr lang="en-US" altLang="ko-KR" sz="2400" dirty="0">
               <a:latin typeface="나눔스퀘어" panose="020B0600000101010101" pitchFamily="50" charset="-127"/>
               <a:ea typeface="나눔스퀘어" panose="020B0600000101010101" pitchFamily="50" charset="-127"/>
@@ -7260,6 +8368,105 @@
 </file>
 
 <file path=ppt/slides/slide3.xml><?xml version="1.0" encoding="utf-8"?>
+<p:sld xmlns:a="http://schemas.openxmlformats.org/drawingml/2006/main" xmlns:r="http://schemas.openxmlformats.org/officeDocument/2006/relationships" xmlns:p="http://schemas.openxmlformats.org/presentationml/2006/main">
+  <p:cSld>
+    <p:spTree>
+      <p:nvGrpSpPr>
+        <p:cNvPr id="1" name=""/>
+        <p:cNvGrpSpPr/>
+        <p:nvPr/>
+      </p:nvGrpSpPr>
+      <p:grpSpPr>
+        <a:xfrm>
+          <a:off x="0" y="0"/>
+          <a:ext cx="0" cy="0"/>
+          <a:chOff x="0" y="0"/>
+          <a:chExt cx="0" cy="0"/>
+        </a:xfrm>
+      </p:grpSpPr>
+      <p:sp>
+        <p:nvSpPr>
+          <p:cNvPr id="2" name="제목 1">
+            <a:extLst>
+              <a:ext uri="{FF2B5EF4-FFF2-40B4-BE49-F238E27FC236}">
+                <a16:creationId xmlns:a16="http://schemas.microsoft.com/office/drawing/2014/main" id="{D40C6CE3-F724-47F8-89B5-E4B379394AB1}"/>
+              </a:ext>
+            </a:extLst>
+          </p:cNvPr>
+          <p:cNvSpPr>
+            <a:spLocks noGrp="1"/>
+          </p:cNvSpPr>
+          <p:nvPr>
+            <p:ph type="ctrTitle"/>
+          </p:nvPr>
+        </p:nvSpPr>
+        <p:spPr/>
+        <p:txBody>
+          <a:bodyPr>
+            <a:normAutofit/>
+          </a:bodyPr>
+          <a:lstStyle/>
+          <a:p>
+            <a:r>
+              <a:rPr lang="en-US" altLang="ko-KR" sz="5400" dirty="0"/>
+              <a:t>1 </a:t>
+            </a:r>
+            <a:r>
+              <a:rPr lang="ko-KR" altLang="en-US" sz="5400" dirty="0"/>
+              <a:t>주차</a:t>
+            </a:r>
+          </a:p>
+        </p:txBody>
+      </p:sp>
+      <p:sp>
+        <p:nvSpPr>
+          <p:cNvPr id="3" name="부제목 2">
+            <a:extLst>
+              <a:ext uri="{FF2B5EF4-FFF2-40B4-BE49-F238E27FC236}">
+                <a16:creationId xmlns:a16="http://schemas.microsoft.com/office/drawing/2014/main" id="{E008D253-F6DC-4039-A6A5-957CF1CA268C}"/>
+              </a:ext>
+            </a:extLst>
+          </p:cNvPr>
+          <p:cNvSpPr>
+            <a:spLocks noGrp="1"/>
+          </p:cNvSpPr>
+          <p:nvPr>
+            <p:ph type="subTitle" idx="1"/>
+          </p:nvPr>
+        </p:nvSpPr>
+        <p:spPr>
+          <a:xfrm>
+            <a:off x="2213263" y="3803073"/>
+            <a:ext cx="9227921" cy="1498768"/>
+          </a:xfrm>
+        </p:spPr>
+        <p:txBody>
+          <a:bodyPr>
+            <a:normAutofit/>
+          </a:bodyPr>
+          <a:lstStyle/>
+          <a:p>
+            <a:endParaRPr lang="en-US" altLang="ko-KR" dirty="0">
+              <a:latin typeface="나눔스퀘어" panose="020B0600000101010101" pitchFamily="50" charset="-127"/>
+              <a:ea typeface="나눔스퀘어" panose="020B0600000101010101" pitchFamily="50" charset="-127"/>
+            </a:endParaRPr>
+          </a:p>
+        </p:txBody>
+      </p:sp>
+    </p:spTree>
+    <p:extLst>
+      <p:ext uri="{BB962C8B-B14F-4D97-AF65-F5344CB8AC3E}">
+        <p14:creationId xmlns:p14="http://schemas.microsoft.com/office/powerpoint/2010/main" val="1627239096"/>
+      </p:ext>
+    </p:extLst>
+  </p:cSld>
+  <p:clrMapOvr>
+    <a:masterClrMapping/>
+  </p:clrMapOvr>
+</p:sld>
+</file>
+
+<file path=ppt/slides/slide4.xml><?xml version="1.0" encoding="utf-8"?>
 <p:sld xmlns:a="http://schemas.openxmlformats.org/drawingml/2006/main" xmlns:r="http://schemas.openxmlformats.org/officeDocument/2006/relationships" xmlns:p="http://schemas.openxmlformats.org/presentationml/2006/main">
   <p:cSld>
     <p:spTree>
@@ -7458,7 +8665,7 @@
 </p:sld>
 </file>
 
-<file path=ppt/slides/slide4.xml><?xml version="1.0" encoding="utf-8"?>
+<file path=ppt/slides/slide5.xml><?xml version="1.0" encoding="utf-8"?>
 <p:sld xmlns:a="http://schemas.openxmlformats.org/drawingml/2006/main" xmlns:r="http://schemas.openxmlformats.org/officeDocument/2006/relationships" xmlns:p="http://schemas.openxmlformats.org/presentationml/2006/main">
   <p:cSld>
     <p:spTree>
@@ -7629,7 +8836,7 @@
 </p:sld>
 </file>
 
-<file path=ppt/slides/slide5.xml><?xml version="1.0" encoding="utf-8"?>
+<file path=ppt/slides/slide6.xml><?xml version="1.0" encoding="utf-8"?>
 <p:sld xmlns:a="http://schemas.openxmlformats.org/drawingml/2006/main" xmlns:r="http://schemas.openxmlformats.org/officeDocument/2006/relationships" xmlns:p="http://schemas.openxmlformats.org/presentationml/2006/main">
   <p:cSld>
     <p:spTree>
@@ -8040,7 +9247,7 @@
 </p:sld>
 </file>
 
-<file path=ppt/slides/slide6.xml><?xml version="1.0" encoding="utf-8"?>
+<file path=ppt/slides/slide7.xml><?xml version="1.0" encoding="utf-8"?>
 <p:sld xmlns:a="http://schemas.openxmlformats.org/drawingml/2006/main" xmlns:r="http://schemas.openxmlformats.org/officeDocument/2006/relationships" xmlns:p="http://schemas.openxmlformats.org/presentationml/2006/main">
   <p:cSld>
     <p:spTree>
@@ -8211,7 +9418,7 @@
 </p:sld>
 </file>
 
-<file path=ppt/slides/slide7.xml><?xml version="1.0" encoding="utf-8"?>
+<file path=ppt/slides/slide8.xml><?xml version="1.0" encoding="utf-8"?>
 <p:sld xmlns:a="http://schemas.openxmlformats.org/drawingml/2006/main" xmlns:r="http://schemas.openxmlformats.org/officeDocument/2006/relationships" xmlns:p="http://schemas.openxmlformats.org/presentationml/2006/main">
   <p:cSld>
     <p:spTree>
@@ -8916,7 +10123,7 @@
 </p:sld>
 </file>
 
-<file path=ppt/slides/slide8.xml><?xml version="1.0" encoding="utf-8"?>
+<file path=ppt/slides/slide9.xml><?xml version="1.0" encoding="utf-8"?>
 <p:sld xmlns:a="http://schemas.openxmlformats.org/drawingml/2006/main" xmlns:r="http://schemas.openxmlformats.org/officeDocument/2006/relationships" xmlns:p="http://schemas.openxmlformats.org/presentationml/2006/main">
   <p:cSld>
     <p:spTree>
@@ -9220,262 +10427,6 @@
     <p:extLst>
       <p:ext uri="{BB962C8B-B14F-4D97-AF65-F5344CB8AC3E}">
         <p14:creationId xmlns:p14="http://schemas.microsoft.com/office/powerpoint/2010/main" val="1976247019"/>
-      </p:ext>
-    </p:extLst>
-  </p:cSld>
-  <p:clrMapOvr>
-    <a:masterClrMapping/>
-  </p:clrMapOvr>
-</p:sld>
-</file>
-
-<file path=ppt/slides/slide9.xml><?xml version="1.0" encoding="utf-8"?>
-<p:sld xmlns:a="http://schemas.openxmlformats.org/drawingml/2006/main" xmlns:r="http://schemas.openxmlformats.org/officeDocument/2006/relationships" xmlns:p="http://schemas.openxmlformats.org/presentationml/2006/main">
-  <p:cSld>
-    <p:spTree>
-      <p:nvGrpSpPr>
-        <p:cNvPr id="1" name=""/>
-        <p:cNvGrpSpPr/>
-        <p:nvPr/>
-      </p:nvGrpSpPr>
-      <p:grpSpPr>
-        <a:xfrm>
-          <a:off x="0" y="0"/>
-          <a:ext cx="0" cy="0"/>
-          <a:chOff x="0" y="0"/>
-          <a:chExt cx="0" cy="0"/>
-        </a:xfrm>
-      </p:grpSpPr>
-      <p:sp>
-        <p:nvSpPr>
-          <p:cNvPr id="2" name="제목 1">
-            <a:extLst>
-              <a:ext uri="{FF2B5EF4-FFF2-40B4-BE49-F238E27FC236}">
-                <a16:creationId xmlns:a16="http://schemas.microsoft.com/office/drawing/2014/main" id="{36E46BD5-9BF8-4A36-B399-C907B8D17343}"/>
-              </a:ext>
-            </a:extLst>
-          </p:cNvPr>
-          <p:cNvSpPr>
-            <a:spLocks noGrp="1"/>
-          </p:cNvSpPr>
-          <p:nvPr>
-            <p:ph type="title"/>
-          </p:nvPr>
-        </p:nvSpPr>
-        <p:spPr/>
-        <p:txBody>
-          <a:bodyPr>
-            <a:normAutofit/>
-          </a:bodyPr>
-          <a:lstStyle/>
-          <a:p>
-            <a:r>
-              <a:rPr lang="ko-KR" altLang="en-US" sz="4400" dirty="0">
-                <a:latin typeface="나눔스퀘어" panose="020B0600000101010101" pitchFamily="50" charset="-127"/>
-                <a:ea typeface="나눔스퀘어" panose="020B0600000101010101" pitchFamily="50" charset="-127"/>
-              </a:rPr>
-              <a:t>문제점</a:t>
-            </a:r>
-          </a:p>
-        </p:txBody>
-      </p:sp>
-      <p:sp>
-        <p:nvSpPr>
-          <p:cNvPr id="3" name="내용 개체 틀 2">
-            <a:extLst>
-              <a:ext uri="{FF2B5EF4-FFF2-40B4-BE49-F238E27FC236}">
-                <a16:creationId xmlns:a16="http://schemas.microsoft.com/office/drawing/2014/main" id="{CE680D33-7DE6-430A-91B0-F2A3DC91933B}"/>
-              </a:ext>
-            </a:extLst>
-          </p:cNvPr>
-          <p:cNvSpPr>
-            <a:spLocks noGrp="1"/>
-          </p:cNvSpPr>
-          <p:nvPr>
-            <p:ph idx="1"/>
-          </p:nvPr>
-        </p:nvSpPr>
-        <p:spPr/>
-        <p:txBody>
-          <a:bodyPr/>
-          <a:lstStyle/>
-          <a:p>
-            <a:pPr>
-              <a:buFont typeface="Wingdings" panose="05000000000000000000" pitchFamily="2" charset="2"/>
-              <a:buChar char="v"/>
-            </a:pPr>
-            <a:endParaRPr lang="en-US" altLang="ko-KR" sz="1400" dirty="0">
-              <a:latin typeface="나눔스퀘어" panose="020B0600000101010101" pitchFamily="50" charset="-127"/>
-              <a:ea typeface="나눔스퀘어" panose="020B0600000101010101" pitchFamily="50" charset="-127"/>
-            </a:endParaRPr>
-          </a:p>
-          <a:p>
-            <a:pPr>
-              <a:buFont typeface="Wingdings" panose="05000000000000000000" pitchFamily="2" charset="2"/>
-              <a:buChar char="v"/>
-            </a:pPr>
-            <a:endParaRPr lang="en-US" altLang="ko-KR" sz="1400" dirty="0">
-              <a:latin typeface="나눔스퀘어" panose="020B0600000101010101" pitchFamily="50" charset="-127"/>
-              <a:ea typeface="나눔스퀘어" panose="020B0600000101010101" pitchFamily="50" charset="-127"/>
-            </a:endParaRPr>
-          </a:p>
-          <a:p>
-            <a:pPr>
-              <a:buFont typeface="Wingdings" panose="05000000000000000000" pitchFamily="2" charset="2"/>
-              <a:buChar char="v"/>
-            </a:pPr>
-            <a:r>
-              <a:rPr lang="en-US" altLang="ko-KR" sz="2400" dirty="0">
-                <a:latin typeface="나눔스퀘어" panose="020B0600000101010101" pitchFamily="50" charset="-127"/>
-                <a:ea typeface="나눔스퀘어" panose="020B0600000101010101" pitchFamily="50" charset="-127"/>
-              </a:rPr>
-              <a:t> Open API</a:t>
-            </a:r>
-            <a:endParaRPr lang="en-US" altLang="ko-KR" sz="1200" dirty="0">
-              <a:latin typeface="나눔스퀘어" panose="020B0600000101010101" pitchFamily="50" charset="-127"/>
-              <a:ea typeface="나눔스퀘어" panose="020B0600000101010101" pitchFamily="50" charset="-127"/>
-            </a:endParaRPr>
-          </a:p>
-          <a:p>
-            <a:pPr lvl="1">
-              <a:buFont typeface="Wingdings" panose="05000000000000000000" pitchFamily="2" charset="2"/>
-              <a:buChar char="Ø"/>
-            </a:pPr>
-            <a:r>
-              <a:rPr lang="en-US" altLang="ko-KR" sz="2200" dirty="0">
-                <a:latin typeface="나눔스퀘어" panose="020B0600000101010101" pitchFamily="50" charset="-127"/>
-                <a:ea typeface="나눔스퀘어" panose="020B0600000101010101" pitchFamily="50" charset="-127"/>
-              </a:rPr>
-              <a:t> </a:t>
-            </a:r>
-            <a:r>
-              <a:rPr lang="ko-KR" altLang="en-US" sz="2200" dirty="0">
-                <a:latin typeface="나눔스퀘어" panose="020B0600000101010101" pitchFamily="50" charset="-127"/>
-                <a:ea typeface="나눔스퀘어" panose="020B0600000101010101" pitchFamily="50" charset="-127"/>
-              </a:rPr>
-              <a:t>프로그램이 새로 실행될 때마다 </a:t>
-            </a:r>
-            <a:r>
-              <a:rPr lang="en-US" altLang="ko-KR" sz="2200" b="1" dirty="0">
-                <a:latin typeface="나눔스퀘어 Bold" panose="020B0600000101010101" pitchFamily="50" charset="-127"/>
-                <a:ea typeface="나눔스퀘어 Bold" panose="020B0600000101010101" pitchFamily="50" charset="-127"/>
-              </a:rPr>
-              <a:t>TrainAPI</a:t>
-            </a:r>
-            <a:r>
-              <a:rPr lang="ko-KR" altLang="en-US" sz="2200" dirty="0">
-                <a:latin typeface="나눔스퀘어" panose="020B0600000101010101" pitchFamily="50" charset="-127"/>
-                <a:ea typeface="나눔스퀘어" panose="020B0600000101010101" pitchFamily="50" charset="-127"/>
-              </a:rPr>
-              <a:t>에서 기차역 목록을 </a:t>
-            </a:r>
-            <a:r>
-              <a:rPr lang="en-US" altLang="ko-KR" sz="2200" dirty="0">
-                <a:latin typeface="나눔스퀘어 Bold" panose="020B0600000101010101" pitchFamily="50" charset="-127"/>
-                <a:ea typeface="나눔스퀘어 Bold" panose="020B0600000101010101" pitchFamily="50" charset="-127"/>
-              </a:rPr>
-              <a:t>OpenAPI</a:t>
-            </a:r>
-            <a:r>
-              <a:rPr lang="ko-KR" altLang="en-US" sz="2200" dirty="0">
-                <a:latin typeface="나눔스퀘어" panose="020B0600000101010101" pitchFamily="50" charset="-127"/>
-                <a:ea typeface="나눔스퀘어" panose="020B0600000101010101" pitchFamily="50" charset="-127"/>
-              </a:rPr>
-              <a:t>에 요청</a:t>
-            </a:r>
-            <a:endParaRPr lang="en-US" altLang="ko-KR" sz="2200" dirty="0">
-              <a:latin typeface="나눔스퀘어" panose="020B0600000101010101" pitchFamily="50" charset="-127"/>
-              <a:ea typeface="나눔스퀘어" panose="020B0600000101010101" pitchFamily="50" charset="-127"/>
-            </a:endParaRPr>
-          </a:p>
-          <a:p>
-            <a:pPr lvl="2">
-              <a:buFont typeface="Wingdings" panose="05000000000000000000" pitchFamily="2" charset="2"/>
-              <a:buChar char="§"/>
-            </a:pPr>
-            <a:r>
-              <a:rPr lang="en-US" altLang="ko-KR" dirty="0">
-                <a:latin typeface="나눔스퀘어" panose="020B0600000101010101" pitchFamily="50" charset="-127"/>
-                <a:ea typeface="나눔스퀘어" panose="020B0600000101010101" pitchFamily="50" charset="-127"/>
-              </a:rPr>
-              <a:t> </a:t>
-            </a:r>
-            <a:r>
-              <a:rPr lang="ko-KR" altLang="en-US" dirty="0">
-                <a:latin typeface="나눔스퀘어" panose="020B0600000101010101" pitchFamily="50" charset="-127"/>
-                <a:ea typeface="나눔스퀘어" panose="020B0600000101010101" pitchFamily="50" charset="-127"/>
-              </a:rPr>
-              <a:t>트래픽 횟수 제한 </a:t>
-            </a:r>
-            <a:r>
-              <a:rPr lang="en-US" altLang="ko-KR" dirty="0">
-                <a:latin typeface="나눔스퀘어" panose="020B0600000101010101" pitchFamily="50" charset="-127"/>
-                <a:ea typeface="나눔스퀘어" panose="020B0600000101010101" pitchFamily="50" charset="-127"/>
-              </a:rPr>
-              <a:t>1000  </a:t>
-            </a:r>
-            <a:r>
-              <a:rPr lang="ko-KR" altLang="en-US" dirty="0">
-                <a:latin typeface="나눔스퀘어" panose="020B0600000101010101" pitchFamily="50" charset="-127"/>
-                <a:ea typeface="나눔스퀘어" panose="020B0600000101010101" pitchFamily="50" charset="-127"/>
-              </a:rPr>
-              <a:t>→  금방 제한에 막힘</a:t>
-            </a:r>
-            <a:endParaRPr lang="en-US" altLang="ko-KR" dirty="0">
-              <a:latin typeface="나눔스퀘어" panose="020B0600000101010101" pitchFamily="50" charset="-127"/>
-              <a:ea typeface="나눔스퀘어" panose="020B0600000101010101" pitchFamily="50" charset="-127"/>
-            </a:endParaRPr>
-          </a:p>
-          <a:p>
-            <a:pPr lvl="2">
-              <a:buFont typeface="Wingdings" panose="05000000000000000000" pitchFamily="2" charset="2"/>
-              <a:buChar char="§"/>
-            </a:pPr>
-            <a:endParaRPr lang="en-US" altLang="ko-KR" dirty="0">
-              <a:latin typeface="나눔스퀘어" panose="020B0600000101010101" pitchFamily="50" charset="-127"/>
-              <a:ea typeface="나눔스퀘어" panose="020B0600000101010101" pitchFamily="50" charset="-127"/>
-            </a:endParaRPr>
-          </a:p>
-          <a:p>
-            <a:pPr>
-              <a:buFont typeface="Wingdings" panose="05000000000000000000" pitchFamily="2" charset="2"/>
-              <a:buChar char="ü"/>
-            </a:pPr>
-            <a:r>
-              <a:rPr lang="en-US" altLang="ko-KR" dirty="0">
-                <a:latin typeface="나눔스퀘어" panose="020B0600000101010101" pitchFamily="50" charset="-127"/>
-                <a:ea typeface="나눔스퀘어" panose="020B0600000101010101" pitchFamily="50" charset="-127"/>
-              </a:rPr>
-              <a:t> </a:t>
-            </a:r>
-            <a:r>
-              <a:rPr lang="ko-KR" altLang="en-US" dirty="0">
-                <a:latin typeface="나눔스퀘어" panose="020B0600000101010101" pitchFamily="50" charset="-127"/>
-                <a:ea typeface="나눔스퀘어" panose="020B0600000101010101" pitchFamily="50" charset="-127"/>
-              </a:rPr>
-              <a:t>파일 입출력으로 해결 예정</a:t>
-            </a:r>
-            <a:endParaRPr lang="en-US" altLang="ko-KR" dirty="0">
-              <a:latin typeface="나눔스퀘어" panose="020B0600000101010101" pitchFamily="50" charset="-127"/>
-              <a:ea typeface="나눔스퀘어" panose="020B0600000101010101" pitchFamily="50" charset="-127"/>
-            </a:endParaRPr>
-          </a:p>
-          <a:p>
-            <a:pPr lvl="1">
-              <a:buFont typeface="Wingdings" panose="05000000000000000000" pitchFamily="2" charset="2"/>
-              <a:buChar char="Ø"/>
-            </a:pPr>
-            <a:endParaRPr lang="en-US" altLang="ko-KR" dirty="0">
-              <a:latin typeface="나눔스퀘어" panose="020B0600000101010101" pitchFamily="50" charset="-127"/>
-              <a:ea typeface="나눔스퀘어" panose="020B0600000101010101" pitchFamily="50" charset="-127"/>
-            </a:endParaRPr>
-          </a:p>
-        </p:txBody>
-      </p:sp>
-    </p:spTree>
-    <p:extLst>
-      <p:ext uri="{BB962C8B-B14F-4D97-AF65-F5344CB8AC3E}">
-        <p14:creationId xmlns:p14="http://schemas.microsoft.com/office/powerpoint/2010/main" val="3101324227"/>
       </p:ext>
     </p:extLst>
   </p:cSld>

</xml_diff>